<commit_message>
add seccomp examples & slides
</commit_message>
<xml_diff>
--- a/Presentation1.pptx
+++ b/Presentation1.pptx
@@ -4,26 +4,25 @@
   <p:sldMasterIdLst>
     <p:sldMasterId id="2147483648" r:id="rId1"/>
   </p:sldMasterIdLst>
-  <p:notesMasterIdLst>
-    <p:notesMasterId r:id="rId17"/>
-  </p:notesMasterIdLst>
   <p:sldIdLst>
-    <p:sldId id="256" r:id="rId4"/>
-    <p:sldId id="257" r:id="rId5"/>
-    <p:sldId id="258" r:id="rId6"/>
-    <p:sldId id="259" r:id="rId7"/>
-    <p:sldId id="260" r:id="rId8"/>
-    <p:sldId id="261" r:id="rId9"/>
-    <p:sldId id="262" r:id="rId10"/>
-    <p:sldId id="263" r:id="rId11"/>
-    <p:sldId id="264" r:id="rId12"/>
-    <p:sldId id="265" r:id="rId13"/>
-    <p:sldId id="266" r:id="rId14"/>
-    <p:sldId id="267" r:id="rId15"/>
-    <p:sldId id="268" r:id="rId16"/>
+    <p:sldId id="256" r:id="rId3"/>
+    <p:sldId id="257" r:id="rId4"/>
+    <p:sldId id="258" r:id="rId5"/>
+    <p:sldId id="259" r:id="rId6"/>
+    <p:sldId id="260" r:id="rId7"/>
+    <p:sldId id="261" r:id="rId8"/>
+    <p:sldId id="262" r:id="rId9"/>
+    <p:sldId id="263" r:id="rId10"/>
+    <p:sldId id="264" r:id="rId11"/>
+    <p:sldId id="265" r:id="rId12"/>
+    <p:sldId id="266" r:id="rId13"/>
+    <p:sldId id="267" r:id="rId14"/>
+    <p:sldId id="268" r:id="rId15"/>
+    <p:sldId id="269" r:id="rId16"/>
+    <p:sldId id="270" r:id="rId17"/>
   </p:sldIdLst>
   <p:sldSz cx="12192000" cy="6858000"/>
-  <p:notesSz cx="6858000" cy="9144000"/>
+  <p:notesSz cx="12192000" cy="6858000"/>
   <p:defaultTextStyle>
     <a:defPPr marR="0" lvl="0" algn="l">
       <a:lnSpc>
@@ -247,3122 +246,6 @@
 </p:presentation>
 </file>
 
-<file path=ppt/notesMasters/notesMaster1.xml><?xml version="1.0" encoding="utf-8"?>
-<p:notesMaster xmlns:a="http://schemas.openxmlformats.org/drawingml/2006/main" xmlns:r="http://schemas.openxmlformats.org/officeDocument/2006/relationships" xmlns:p="http://schemas.openxmlformats.org/presentationml/2006/main">
-  <p:cSld name="">
-    <p:bg>
-      <p:bgPr shadeToTitle="0">
-        <a:solidFill>
-          <a:schemeClr val="lt1"/>
-        </a:solidFill>
-      </p:bgPr>
-    </p:bg>
-    <p:spTree>
-      <p:nvGrpSpPr>
-        <p:cNvPr id="1" name=""/>
-        <p:cNvGrpSpPr/>
-        <p:nvPr/>
-      </p:nvGrpSpPr>
-      <p:grpSpPr bwMode="auto">
-        <a:xfrm>
-          <a:off x="0" y="0"/>
-          <a:ext cx="0" cy="0"/>
-          <a:chOff x="0" y="0"/>
-          <a:chExt cx="0" cy="0"/>
-        </a:xfrm>
-      </p:grpSpPr>
-      <p:sp>
-        <p:nvSpPr>
-          <p:cNvPr id="3" name="Google Shape;3;n"/>
-          <p:cNvSpPr txBox="1"/>
-          <p:nvPr>
-            <p:ph type="hdr" idx="2"/>
-          </p:nvPr>
-        </p:nvSpPr>
-        <p:spPr bwMode="auto">
-          <a:xfrm>
-            <a:off x="0" y="0"/>
-            <a:ext cx="2971800" cy="458788"/>
-          </a:xfrm>
-          <a:prstGeom prst="rect">
-            <a:avLst/>
-          </a:prstGeom>
-          <a:noFill/>
-          <a:ln>
-            <a:noFill/>
-          </a:ln>
-        </p:spPr>
-        <p:txBody>
-          <a:bodyPr spcFirstLastPara="1" wrap="square" lIns="91425" tIns="45700" rIns="91425" bIns="45700" anchor="t" anchorCtr="0">
-            <a:noAutofit/>
-          </a:bodyPr>
-          <a:lstStyle>
-            <a:lvl1pPr marR="0" lvl="0" algn="l">
-              <a:spcBef>
-                <a:spcPts val="0"/>
-              </a:spcBef>
-              <a:spcAft>
-                <a:spcPts val="0"/>
-              </a:spcAft>
-              <a:buSzPts val="1400"/>
-              <a:buNone/>
-              <a:defRPr sz="1200" b="0" i="0" u="none" strike="noStrike" cap="none">
-                <a:solidFill>
-                  <a:schemeClr val="dk1"/>
-                </a:solidFill>
-                <a:latin typeface="Arial"/>
-                <a:ea typeface="Arial"/>
-                <a:cs typeface="Arial"/>
-              </a:defRPr>
-            </a:lvl1pPr>
-            <a:lvl2pPr marR="0" lvl="1" algn="l">
-              <a:spcBef>
-                <a:spcPts val="0"/>
-              </a:spcBef>
-              <a:spcAft>
-                <a:spcPts val="0"/>
-              </a:spcAft>
-              <a:buSzPts val="1400"/>
-              <a:buNone/>
-              <a:defRPr sz="1800" b="0" i="0" u="none" strike="noStrike" cap="none">
-                <a:solidFill>
-                  <a:schemeClr val="dk1"/>
-                </a:solidFill>
-                <a:latin typeface="Arial"/>
-                <a:ea typeface="Arial"/>
-                <a:cs typeface="Arial"/>
-              </a:defRPr>
-            </a:lvl2pPr>
-            <a:lvl3pPr marR="0" lvl="2" algn="l">
-              <a:spcBef>
-                <a:spcPts val="0"/>
-              </a:spcBef>
-              <a:spcAft>
-                <a:spcPts val="0"/>
-              </a:spcAft>
-              <a:buSzPts val="1400"/>
-              <a:buNone/>
-              <a:defRPr sz="1800" b="0" i="0" u="none" strike="noStrike" cap="none">
-                <a:solidFill>
-                  <a:schemeClr val="dk1"/>
-                </a:solidFill>
-                <a:latin typeface="Arial"/>
-                <a:ea typeface="Arial"/>
-                <a:cs typeface="Arial"/>
-              </a:defRPr>
-            </a:lvl3pPr>
-            <a:lvl4pPr marR="0" lvl="3" algn="l">
-              <a:spcBef>
-                <a:spcPts val="0"/>
-              </a:spcBef>
-              <a:spcAft>
-                <a:spcPts val="0"/>
-              </a:spcAft>
-              <a:buSzPts val="1400"/>
-              <a:buNone/>
-              <a:defRPr sz="1800" b="0" i="0" u="none" strike="noStrike" cap="none">
-                <a:solidFill>
-                  <a:schemeClr val="dk1"/>
-                </a:solidFill>
-                <a:latin typeface="Arial"/>
-                <a:ea typeface="Arial"/>
-                <a:cs typeface="Arial"/>
-              </a:defRPr>
-            </a:lvl4pPr>
-            <a:lvl5pPr marR="0" lvl="4" algn="l">
-              <a:spcBef>
-                <a:spcPts val="0"/>
-              </a:spcBef>
-              <a:spcAft>
-                <a:spcPts val="0"/>
-              </a:spcAft>
-              <a:buSzPts val="1400"/>
-              <a:buNone/>
-              <a:defRPr sz="1800" b="0" i="0" u="none" strike="noStrike" cap="none">
-                <a:solidFill>
-                  <a:schemeClr val="dk1"/>
-                </a:solidFill>
-                <a:latin typeface="Arial"/>
-                <a:ea typeface="Arial"/>
-                <a:cs typeface="Arial"/>
-              </a:defRPr>
-            </a:lvl5pPr>
-            <a:lvl6pPr marR="0" lvl="5" algn="l">
-              <a:spcBef>
-                <a:spcPts val="0"/>
-              </a:spcBef>
-              <a:spcAft>
-                <a:spcPts val="0"/>
-              </a:spcAft>
-              <a:buSzPts val="1400"/>
-              <a:buNone/>
-              <a:defRPr sz="1800" b="0" i="0" u="none" strike="noStrike" cap="none">
-                <a:solidFill>
-                  <a:schemeClr val="dk1"/>
-                </a:solidFill>
-                <a:latin typeface="Arial"/>
-                <a:ea typeface="Arial"/>
-                <a:cs typeface="Arial"/>
-              </a:defRPr>
-            </a:lvl6pPr>
-            <a:lvl7pPr marR="0" lvl="6" algn="l">
-              <a:spcBef>
-                <a:spcPts val="0"/>
-              </a:spcBef>
-              <a:spcAft>
-                <a:spcPts val="0"/>
-              </a:spcAft>
-              <a:buSzPts val="1400"/>
-              <a:buNone/>
-              <a:defRPr sz="1800" b="0" i="0" u="none" strike="noStrike" cap="none">
-                <a:solidFill>
-                  <a:schemeClr val="dk1"/>
-                </a:solidFill>
-                <a:latin typeface="Arial"/>
-                <a:ea typeface="Arial"/>
-                <a:cs typeface="Arial"/>
-              </a:defRPr>
-            </a:lvl7pPr>
-            <a:lvl8pPr marR="0" lvl="7" algn="l">
-              <a:spcBef>
-                <a:spcPts val="0"/>
-              </a:spcBef>
-              <a:spcAft>
-                <a:spcPts val="0"/>
-              </a:spcAft>
-              <a:buSzPts val="1400"/>
-              <a:buNone/>
-              <a:defRPr sz="1800" b="0" i="0" u="none" strike="noStrike" cap="none">
-                <a:solidFill>
-                  <a:schemeClr val="dk1"/>
-                </a:solidFill>
-                <a:latin typeface="Arial"/>
-                <a:ea typeface="Arial"/>
-                <a:cs typeface="Arial"/>
-              </a:defRPr>
-            </a:lvl8pPr>
-            <a:lvl9pPr marR="0" lvl="8" algn="l">
-              <a:spcBef>
-                <a:spcPts val="0"/>
-              </a:spcBef>
-              <a:spcAft>
-                <a:spcPts val="0"/>
-              </a:spcAft>
-              <a:buSzPts val="1400"/>
-              <a:buNone/>
-              <a:defRPr sz="1800" b="0" i="0" u="none" strike="noStrike" cap="none">
-                <a:solidFill>
-                  <a:schemeClr val="dk1"/>
-                </a:solidFill>
-                <a:latin typeface="Arial"/>
-                <a:ea typeface="Arial"/>
-                <a:cs typeface="Arial"/>
-              </a:defRPr>
-            </a:lvl9pPr>
-          </a:lstStyle>
-          <a:p>
-            <a:pPr>
-              <a:defRPr/>
-            </a:pPr>
-            <a:endParaRPr/>
-          </a:p>
-        </p:txBody>
-      </p:sp>
-      <p:sp>
-        <p:nvSpPr>
-          <p:cNvPr id="4" name="Google Shape;4;n"/>
-          <p:cNvSpPr txBox="1"/>
-          <p:nvPr>
-            <p:ph type="dt" idx="10"/>
-          </p:nvPr>
-        </p:nvSpPr>
-        <p:spPr bwMode="auto">
-          <a:xfrm>
-            <a:off x="3884613" y="0"/>
-            <a:ext cx="2971800" cy="458788"/>
-          </a:xfrm>
-          <a:prstGeom prst="rect">
-            <a:avLst/>
-          </a:prstGeom>
-          <a:noFill/>
-          <a:ln>
-            <a:noFill/>
-          </a:ln>
-        </p:spPr>
-        <p:txBody>
-          <a:bodyPr spcFirstLastPara="1" wrap="square" lIns="91425" tIns="45700" rIns="91425" bIns="45700" anchor="t" anchorCtr="0">
-            <a:noAutofit/>
-          </a:bodyPr>
-          <a:lstStyle>
-            <a:lvl1pPr marR="0" lvl="0" algn="r">
-              <a:spcBef>
-                <a:spcPts val="0"/>
-              </a:spcBef>
-              <a:spcAft>
-                <a:spcPts val="0"/>
-              </a:spcAft>
-              <a:buSzPts val="1400"/>
-              <a:buNone/>
-              <a:defRPr sz="1200" b="0" i="0" u="none" strike="noStrike" cap="none">
-                <a:solidFill>
-                  <a:schemeClr val="dk1"/>
-                </a:solidFill>
-                <a:latin typeface="Arial"/>
-                <a:ea typeface="Arial"/>
-                <a:cs typeface="Arial"/>
-              </a:defRPr>
-            </a:lvl1pPr>
-            <a:lvl2pPr marR="0" lvl="1" algn="l">
-              <a:spcBef>
-                <a:spcPts val="0"/>
-              </a:spcBef>
-              <a:spcAft>
-                <a:spcPts val="0"/>
-              </a:spcAft>
-              <a:buSzPts val="1400"/>
-              <a:buNone/>
-              <a:defRPr sz="1800" b="0" i="0" u="none" strike="noStrike" cap="none">
-                <a:solidFill>
-                  <a:schemeClr val="dk1"/>
-                </a:solidFill>
-                <a:latin typeface="Arial"/>
-                <a:ea typeface="Arial"/>
-                <a:cs typeface="Arial"/>
-              </a:defRPr>
-            </a:lvl2pPr>
-            <a:lvl3pPr marR="0" lvl="2" algn="l">
-              <a:spcBef>
-                <a:spcPts val="0"/>
-              </a:spcBef>
-              <a:spcAft>
-                <a:spcPts val="0"/>
-              </a:spcAft>
-              <a:buSzPts val="1400"/>
-              <a:buNone/>
-              <a:defRPr sz="1800" b="0" i="0" u="none" strike="noStrike" cap="none">
-                <a:solidFill>
-                  <a:schemeClr val="dk1"/>
-                </a:solidFill>
-                <a:latin typeface="Arial"/>
-                <a:ea typeface="Arial"/>
-                <a:cs typeface="Arial"/>
-              </a:defRPr>
-            </a:lvl3pPr>
-            <a:lvl4pPr marR="0" lvl="3" algn="l">
-              <a:spcBef>
-                <a:spcPts val="0"/>
-              </a:spcBef>
-              <a:spcAft>
-                <a:spcPts val="0"/>
-              </a:spcAft>
-              <a:buSzPts val="1400"/>
-              <a:buNone/>
-              <a:defRPr sz="1800" b="0" i="0" u="none" strike="noStrike" cap="none">
-                <a:solidFill>
-                  <a:schemeClr val="dk1"/>
-                </a:solidFill>
-                <a:latin typeface="Arial"/>
-                <a:ea typeface="Arial"/>
-                <a:cs typeface="Arial"/>
-              </a:defRPr>
-            </a:lvl4pPr>
-            <a:lvl5pPr marR="0" lvl="4" algn="l">
-              <a:spcBef>
-                <a:spcPts val="0"/>
-              </a:spcBef>
-              <a:spcAft>
-                <a:spcPts val="0"/>
-              </a:spcAft>
-              <a:buSzPts val="1400"/>
-              <a:buNone/>
-              <a:defRPr sz="1800" b="0" i="0" u="none" strike="noStrike" cap="none">
-                <a:solidFill>
-                  <a:schemeClr val="dk1"/>
-                </a:solidFill>
-                <a:latin typeface="Arial"/>
-                <a:ea typeface="Arial"/>
-                <a:cs typeface="Arial"/>
-              </a:defRPr>
-            </a:lvl5pPr>
-            <a:lvl6pPr marR="0" lvl="5" algn="l">
-              <a:spcBef>
-                <a:spcPts val="0"/>
-              </a:spcBef>
-              <a:spcAft>
-                <a:spcPts val="0"/>
-              </a:spcAft>
-              <a:buSzPts val="1400"/>
-              <a:buNone/>
-              <a:defRPr sz="1800" b="0" i="0" u="none" strike="noStrike" cap="none">
-                <a:solidFill>
-                  <a:schemeClr val="dk1"/>
-                </a:solidFill>
-                <a:latin typeface="Arial"/>
-                <a:ea typeface="Arial"/>
-                <a:cs typeface="Arial"/>
-              </a:defRPr>
-            </a:lvl6pPr>
-            <a:lvl7pPr marR="0" lvl="6" algn="l">
-              <a:spcBef>
-                <a:spcPts val="0"/>
-              </a:spcBef>
-              <a:spcAft>
-                <a:spcPts val="0"/>
-              </a:spcAft>
-              <a:buSzPts val="1400"/>
-              <a:buNone/>
-              <a:defRPr sz="1800" b="0" i="0" u="none" strike="noStrike" cap="none">
-                <a:solidFill>
-                  <a:schemeClr val="dk1"/>
-                </a:solidFill>
-                <a:latin typeface="Arial"/>
-                <a:ea typeface="Arial"/>
-                <a:cs typeface="Arial"/>
-              </a:defRPr>
-            </a:lvl7pPr>
-            <a:lvl8pPr marR="0" lvl="7" algn="l">
-              <a:spcBef>
-                <a:spcPts val="0"/>
-              </a:spcBef>
-              <a:spcAft>
-                <a:spcPts val="0"/>
-              </a:spcAft>
-              <a:buSzPts val="1400"/>
-              <a:buNone/>
-              <a:defRPr sz="1800" b="0" i="0" u="none" strike="noStrike" cap="none">
-                <a:solidFill>
-                  <a:schemeClr val="dk1"/>
-                </a:solidFill>
-                <a:latin typeface="Arial"/>
-                <a:ea typeface="Arial"/>
-                <a:cs typeface="Arial"/>
-              </a:defRPr>
-            </a:lvl8pPr>
-            <a:lvl9pPr marR="0" lvl="8" algn="l">
-              <a:spcBef>
-                <a:spcPts val="0"/>
-              </a:spcBef>
-              <a:spcAft>
-                <a:spcPts val="0"/>
-              </a:spcAft>
-              <a:buSzPts val="1400"/>
-              <a:buNone/>
-              <a:defRPr sz="1800" b="0" i="0" u="none" strike="noStrike" cap="none">
-                <a:solidFill>
-                  <a:schemeClr val="dk1"/>
-                </a:solidFill>
-                <a:latin typeface="Arial"/>
-                <a:ea typeface="Arial"/>
-                <a:cs typeface="Arial"/>
-              </a:defRPr>
-            </a:lvl9pPr>
-          </a:lstStyle>
-          <a:p>
-            <a:pPr>
-              <a:defRPr/>
-            </a:pPr>
-            <a:endParaRPr/>
-          </a:p>
-        </p:txBody>
-      </p:sp>
-      <p:sp>
-        <p:nvSpPr>
-          <p:cNvPr id="5" name="Google Shape;5;n"/>
-          <p:cNvSpPr/>
-          <p:nvPr>
-            <p:ph type="sldImg" idx="3"/>
-          </p:nvPr>
-        </p:nvSpPr>
-        <p:spPr bwMode="auto">
-          <a:xfrm>
-            <a:off x="685800" y="1143000"/>
-            <a:ext cx="5486400" cy="3086100"/>
-          </a:xfrm>
-          <a:custGeom>
-            <a:avLst/>
-            <a:gdLst/>
-            <a:ahLst/>
-            <a:cxnLst/>
-            <a:rect l="l" t="t" r="r" b="b"/>
-            <a:pathLst>
-              <a:path w="120000" h="120000" fill="norm" stroke="1" extrusionOk="0">
-                <a:moveTo>
-                  <a:pt x="0" y="0"/>
-                </a:moveTo>
-                <a:lnTo>
-                  <a:pt x="120000" y="0"/>
-                </a:lnTo>
-                <a:lnTo>
-                  <a:pt x="120000" y="120000"/>
-                </a:lnTo>
-                <a:lnTo>
-                  <a:pt x="0" y="120000"/>
-                </a:lnTo>
-                <a:close/>
-              </a:path>
-            </a:pathLst>
-          </a:custGeom>
-          <a:noFill/>
-          <a:ln w="12700" cap="flat" cmpd="sng">
-            <a:solidFill>
-              <a:srgbClr val="000000"/>
-            </a:solidFill>
-            <a:prstDash val="solid"/>
-            <a:round/>
-            <a:headEnd type="none" w="sm" len="sm"/>
-            <a:tailEnd type="none" w="sm" len="sm"/>
-          </a:ln>
-        </p:spPr>
-      </p:sp>
-      <p:sp>
-        <p:nvSpPr>
-          <p:cNvPr id="6" name="Google Shape;6;n"/>
-          <p:cNvSpPr txBox="1"/>
-          <p:nvPr>
-            <p:ph type="body" idx="1"/>
-          </p:nvPr>
-        </p:nvSpPr>
-        <p:spPr bwMode="auto">
-          <a:xfrm>
-            <a:off x="685800" y="4400550"/>
-            <a:ext cx="5486400" cy="3600450"/>
-          </a:xfrm>
-          <a:prstGeom prst="rect">
-            <a:avLst/>
-          </a:prstGeom>
-          <a:noFill/>
-          <a:ln>
-            <a:noFill/>
-          </a:ln>
-        </p:spPr>
-        <p:txBody>
-          <a:bodyPr spcFirstLastPara="1" wrap="square" lIns="91425" tIns="45700" rIns="91425" bIns="45700" anchor="t" anchorCtr="0">
-            <a:noAutofit/>
-          </a:bodyPr>
-          <a:lstStyle>
-            <a:lvl1pPr marL="457200" marR="0" lvl="0" indent="-228600" algn="l">
-              <a:spcBef>
-                <a:spcPts val="0"/>
-              </a:spcBef>
-              <a:spcAft>
-                <a:spcPts val="0"/>
-              </a:spcAft>
-              <a:buSzPts val="1400"/>
-              <a:buNone/>
-              <a:defRPr sz="1200" b="0" i="0" u="none" strike="noStrike" cap="none">
-                <a:solidFill>
-                  <a:schemeClr val="dk1"/>
-                </a:solidFill>
-                <a:latin typeface="Arial"/>
-                <a:ea typeface="Arial"/>
-                <a:cs typeface="Arial"/>
-              </a:defRPr>
-            </a:lvl1pPr>
-            <a:lvl2pPr marL="914400" marR="0" lvl="1" indent="-228600" algn="l">
-              <a:spcBef>
-                <a:spcPts val="0"/>
-              </a:spcBef>
-              <a:spcAft>
-                <a:spcPts val="0"/>
-              </a:spcAft>
-              <a:buSzPts val="1400"/>
-              <a:buNone/>
-              <a:defRPr sz="1200" b="0" i="0" u="none" strike="noStrike" cap="none">
-                <a:solidFill>
-                  <a:schemeClr val="dk1"/>
-                </a:solidFill>
-                <a:latin typeface="Arial"/>
-                <a:ea typeface="Arial"/>
-                <a:cs typeface="Arial"/>
-              </a:defRPr>
-            </a:lvl2pPr>
-            <a:lvl3pPr marL="1371600" marR="0" lvl="2" indent="-228600" algn="l">
-              <a:spcBef>
-                <a:spcPts val="0"/>
-              </a:spcBef>
-              <a:spcAft>
-                <a:spcPts val="0"/>
-              </a:spcAft>
-              <a:buSzPts val="1400"/>
-              <a:buNone/>
-              <a:defRPr sz="1200" b="0" i="0" u="none" strike="noStrike" cap="none">
-                <a:solidFill>
-                  <a:schemeClr val="dk1"/>
-                </a:solidFill>
-                <a:latin typeface="Arial"/>
-                <a:ea typeface="Arial"/>
-                <a:cs typeface="Arial"/>
-              </a:defRPr>
-            </a:lvl3pPr>
-            <a:lvl4pPr marL="1828800" marR="0" lvl="3" indent="-228600" algn="l">
-              <a:spcBef>
-                <a:spcPts val="0"/>
-              </a:spcBef>
-              <a:spcAft>
-                <a:spcPts val="0"/>
-              </a:spcAft>
-              <a:buSzPts val="1400"/>
-              <a:buNone/>
-              <a:defRPr sz="1200" b="0" i="0" u="none" strike="noStrike" cap="none">
-                <a:solidFill>
-                  <a:schemeClr val="dk1"/>
-                </a:solidFill>
-                <a:latin typeface="Arial"/>
-                <a:ea typeface="Arial"/>
-                <a:cs typeface="Arial"/>
-              </a:defRPr>
-            </a:lvl4pPr>
-            <a:lvl5pPr marL="2286000" marR="0" lvl="4" indent="-228600" algn="l">
-              <a:spcBef>
-                <a:spcPts val="0"/>
-              </a:spcBef>
-              <a:spcAft>
-                <a:spcPts val="0"/>
-              </a:spcAft>
-              <a:buSzPts val="1400"/>
-              <a:buNone/>
-              <a:defRPr sz="1200" b="0" i="0" u="none" strike="noStrike" cap="none">
-                <a:solidFill>
-                  <a:schemeClr val="dk1"/>
-                </a:solidFill>
-                <a:latin typeface="Arial"/>
-                <a:ea typeface="Arial"/>
-                <a:cs typeface="Arial"/>
-              </a:defRPr>
-            </a:lvl5pPr>
-            <a:lvl6pPr marL="2743200" marR="0" lvl="5" indent="-228600" algn="l">
-              <a:spcBef>
-                <a:spcPts val="0"/>
-              </a:spcBef>
-              <a:spcAft>
-                <a:spcPts val="0"/>
-              </a:spcAft>
-              <a:buSzPts val="1400"/>
-              <a:buNone/>
-              <a:defRPr sz="1200" b="0" i="0" u="none" strike="noStrike" cap="none">
-                <a:solidFill>
-                  <a:schemeClr val="dk1"/>
-                </a:solidFill>
-                <a:latin typeface="Arial"/>
-                <a:ea typeface="Arial"/>
-                <a:cs typeface="Arial"/>
-              </a:defRPr>
-            </a:lvl6pPr>
-            <a:lvl7pPr marL="3200400" marR="0" lvl="6" indent="-228600" algn="l">
-              <a:spcBef>
-                <a:spcPts val="0"/>
-              </a:spcBef>
-              <a:spcAft>
-                <a:spcPts val="0"/>
-              </a:spcAft>
-              <a:buSzPts val="1400"/>
-              <a:buNone/>
-              <a:defRPr sz="1200" b="0" i="0" u="none" strike="noStrike" cap="none">
-                <a:solidFill>
-                  <a:schemeClr val="dk1"/>
-                </a:solidFill>
-                <a:latin typeface="Arial"/>
-                <a:ea typeface="Arial"/>
-                <a:cs typeface="Arial"/>
-              </a:defRPr>
-            </a:lvl7pPr>
-            <a:lvl8pPr marL="3657600" marR="0" lvl="7" indent="-228600" algn="l">
-              <a:spcBef>
-                <a:spcPts val="0"/>
-              </a:spcBef>
-              <a:spcAft>
-                <a:spcPts val="0"/>
-              </a:spcAft>
-              <a:buSzPts val="1400"/>
-              <a:buNone/>
-              <a:defRPr sz="1200" b="0" i="0" u="none" strike="noStrike" cap="none">
-                <a:solidFill>
-                  <a:schemeClr val="dk1"/>
-                </a:solidFill>
-                <a:latin typeface="Arial"/>
-                <a:ea typeface="Arial"/>
-                <a:cs typeface="Arial"/>
-              </a:defRPr>
-            </a:lvl8pPr>
-            <a:lvl9pPr marL="4114800" marR="0" lvl="8" indent="-228600" algn="l">
-              <a:spcBef>
-                <a:spcPts val="0"/>
-              </a:spcBef>
-              <a:spcAft>
-                <a:spcPts val="0"/>
-              </a:spcAft>
-              <a:buSzPts val="1400"/>
-              <a:buNone/>
-              <a:defRPr sz="1200" b="0" i="0" u="none" strike="noStrike" cap="none">
-                <a:solidFill>
-                  <a:schemeClr val="dk1"/>
-                </a:solidFill>
-                <a:latin typeface="Arial"/>
-                <a:ea typeface="Arial"/>
-                <a:cs typeface="Arial"/>
-              </a:defRPr>
-            </a:lvl9pPr>
-          </a:lstStyle>
-          <a:p>
-            <a:pPr>
-              <a:defRPr/>
-            </a:pPr>
-            <a:endParaRPr/>
-          </a:p>
-        </p:txBody>
-      </p:sp>
-      <p:sp>
-        <p:nvSpPr>
-          <p:cNvPr id="7" name="Google Shape;7;n"/>
-          <p:cNvSpPr txBox="1"/>
-          <p:nvPr>
-            <p:ph type="ftr" idx="11"/>
-          </p:nvPr>
-        </p:nvSpPr>
-        <p:spPr bwMode="auto">
-          <a:xfrm>
-            <a:off x="0" y="8685213"/>
-            <a:ext cx="2971800" cy="458787"/>
-          </a:xfrm>
-          <a:prstGeom prst="rect">
-            <a:avLst/>
-          </a:prstGeom>
-          <a:noFill/>
-          <a:ln>
-            <a:noFill/>
-          </a:ln>
-        </p:spPr>
-        <p:txBody>
-          <a:bodyPr spcFirstLastPara="1" wrap="square" lIns="91425" tIns="45700" rIns="91425" bIns="45700" anchor="b" anchorCtr="0">
-            <a:noAutofit/>
-          </a:bodyPr>
-          <a:lstStyle>
-            <a:lvl1pPr marR="0" lvl="0" algn="l">
-              <a:spcBef>
-                <a:spcPts val="0"/>
-              </a:spcBef>
-              <a:spcAft>
-                <a:spcPts val="0"/>
-              </a:spcAft>
-              <a:buSzPts val="1400"/>
-              <a:buNone/>
-              <a:defRPr sz="1200" b="0" i="0" u="none" strike="noStrike" cap="none">
-                <a:solidFill>
-                  <a:schemeClr val="dk1"/>
-                </a:solidFill>
-                <a:latin typeface="Arial"/>
-                <a:ea typeface="Arial"/>
-                <a:cs typeface="Arial"/>
-              </a:defRPr>
-            </a:lvl1pPr>
-            <a:lvl2pPr marR="0" lvl="1" algn="l">
-              <a:spcBef>
-                <a:spcPts val="0"/>
-              </a:spcBef>
-              <a:spcAft>
-                <a:spcPts val="0"/>
-              </a:spcAft>
-              <a:buSzPts val="1400"/>
-              <a:buNone/>
-              <a:defRPr sz="1800" b="0" i="0" u="none" strike="noStrike" cap="none">
-                <a:solidFill>
-                  <a:schemeClr val="dk1"/>
-                </a:solidFill>
-                <a:latin typeface="Arial"/>
-                <a:ea typeface="Arial"/>
-                <a:cs typeface="Arial"/>
-              </a:defRPr>
-            </a:lvl2pPr>
-            <a:lvl3pPr marR="0" lvl="2" algn="l">
-              <a:spcBef>
-                <a:spcPts val="0"/>
-              </a:spcBef>
-              <a:spcAft>
-                <a:spcPts val="0"/>
-              </a:spcAft>
-              <a:buSzPts val="1400"/>
-              <a:buNone/>
-              <a:defRPr sz="1800" b="0" i="0" u="none" strike="noStrike" cap="none">
-                <a:solidFill>
-                  <a:schemeClr val="dk1"/>
-                </a:solidFill>
-                <a:latin typeface="Arial"/>
-                <a:ea typeface="Arial"/>
-                <a:cs typeface="Arial"/>
-              </a:defRPr>
-            </a:lvl3pPr>
-            <a:lvl4pPr marR="0" lvl="3" algn="l">
-              <a:spcBef>
-                <a:spcPts val="0"/>
-              </a:spcBef>
-              <a:spcAft>
-                <a:spcPts val="0"/>
-              </a:spcAft>
-              <a:buSzPts val="1400"/>
-              <a:buNone/>
-              <a:defRPr sz="1800" b="0" i="0" u="none" strike="noStrike" cap="none">
-                <a:solidFill>
-                  <a:schemeClr val="dk1"/>
-                </a:solidFill>
-                <a:latin typeface="Arial"/>
-                <a:ea typeface="Arial"/>
-                <a:cs typeface="Arial"/>
-              </a:defRPr>
-            </a:lvl4pPr>
-            <a:lvl5pPr marR="0" lvl="4" algn="l">
-              <a:spcBef>
-                <a:spcPts val="0"/>
-              </a:spcBef>
-              <a:spcAft>
-                <a:spcPts val="0"/>
-              </a:spcAft>
-              <a:buSzPts val="1400"/>
-              <a:buNone/>
-              <a:defRPr sz="1800" b="0" i="0" u="none" strike="noStrike" cap="none">
-                <a:solidFill>
-                  <a:schemeClr val="dk1"/>
-                </a:solidFill>
-                <a:latin typeface="Arial"/>
-                <a:ea typeface="Arial"/>
-                <a:cs typeface="Arial"/>
-              </a:defRPr>
-            </a:lvl5pPr>
-            <a:lvl6pPr marR="0" lvl="5" algn="l">
-              <a:spcBef>
-                <a:spcPts val="0"/>
-              </a:spcBef>
-              <a:spcAft>
-                <a:spcPts val="0"/>
-              </a:spcAft>
-              <a:buSzPts val="1400"/>
-              <a:buNone/>
-              <a:defRPr sz="1800" b="0" i="0" u="none" strike="noStrike" cap="none">
-                <a:solidFill>
-                  <a:schemeClr val="dk1"/>
-                </a:solidFill>
-                <a:latin typeface="Arial"/>
-                <a:ea typeface="Arial"/>
-                <a:cs typeface="Arial"/>
-              </a:defRPr>
-            </a:lvl6pPr>
-            <a:lvl7pPr marR="0" lvl="6" algn="l">
-              <a:spcBef>
-                <a:spcPts val="0"/>
-              </a:spcBef>
-              <a:spcAft>
-                <a:spcPts val="0"/>
-              </a:spcAft>
-              <a:buSzPts val="1400"/>
-              <a:buNone/>
-              <a:defRPr sz="1800" b="0" i="0" u="none" strike="noStrike" cap="none">
-                <a:solidFill>
-                  <a:schemeClr val="dk1"/>
-                </a:solidFill>
-                <a:latin typeface="Arial"/>
-                <a:ea typeface="Arial"/>
-                <a:cs typeface="Arial"/>
-              </a:defRPr>
-            </a:lvl7pPr>
-            <a:lvl8pPr marR="0" lvl="7" algn="l">
-              <a:spcBef>
-                <a:spcPts val="0"/>
-              </a:spcBef>
-              <a:spcAft>
-                <a:spcPts val="0"/>
-              </a:spcAft>
-              <a:buSzPts val="1400"/>
-              <a:buNone/>
-              <a:defRPr sz="1800" b="0" i="0" u="none" strike="noStrike" cap="none">
-                <a:solidFill>
-                  <a:schemeClr val="dk1"/>
-                </a:solidFill>
-                <a:latin typeface="Arial"/>
-                <a:ea typeface="Arial"/>
-                <a:cs typeface="Arial"/>
-              </a:defRPr>
-            </a:lvl8pPr>
-            <a:lvl9pPr marR="0" lvl="8" algn="l">
-              <a:spcBef>
-                <a:spcPts val="0"/>
-              </a:spcBef>
-              <a:spcAft>
-                <a:spcPts val="0"/>
-              </a:spcAft>
-              <a:buSzPts val="1400"/>
-              <a:buNone/>
-              <a:defRPr sz="1800" b="0" i="0" u="none" strike="noStrike" cap="none">
-                <a:solidFill>
-                  <a:schemeClr val="dk1"/>
-                </a:solidFill>
-                <a:latin typeface="Arial"/>
-                <a:ea typeface="Arial"/>
-                <a:cs typeface="Arial"/>
-              </a:defRPr>
-            </a:lvl9pPr>
-          </a:lstStyle>
-          <a:p>
-            <a:pPr>
-              <a:defRPr/>
-            </a:pPr>
-            <a:endParaRPr/>
-          </a:p>
-        </p:txBody>
-      </p:sp>
-      <p:sp>
-        <p:nvSpPr>
-          <p:cNvPr id="8" name="Google Shape;8;n"/>
-          <p:cNvSpPr txBox="1"/>
-          <p:nvPr>
-            <p:ph type="sldNum" idx="12"/>
-          </p:nvPr>
-        </p:nvSpPr>
-        <p:spPr bwMode="auto">
-          <a:xfrm>
-            <a:off x="3884613" y="8685213"/>
-            <a:ext cx="2971800" cy="458787"/>
-          </a:xfrm>
-          <a:prstGeom prst="rect">
-            <a:avLst/>
-          </a:prstGeom>
-          <a:noFill/>
-          <a:ln>
-            <a:noFill/>
-          </a:ln>
-        </p:spPr>
-        <p:txBody>
-          <a:bodyPr spcFirstLastPara="1" wrap="square" lIns="91425" tIns="45700" rIns="91425" bIns="45700" anchor="b" anchorCtr="0">
-            <a:noAutofit/>
-          </a:bodyPr>
-          <a:lstStyle/>
-          <a:p>
-            <a:pPr marL="0" marR="0" lvl="0" indent="0" algn="r">
-              <a:spcBef>
-                <a:spcPts val="0"/>
-              </a:spcBef>
-              <a:spcAft>
-                <a:spcPts val="0"/>
-              </a:spcAft>
-              <a:buNone/>
-              <a:defRPr/>
-            </a:pPr>
-            <a:fld id="{00000000-1234-1234-1234-123412341234}" type="slidenum">
-              <a:rPr lang="en-US" sz="1200" b="0" i="0" u="none" strike="noStrike" cap="none">
-                <a:solidFill>
-                  <a:schemeClr val="dk1"/>
-                </a:solidFill>
-                <a:latin typeface="Arial"/>
-                <a:ea typeface="Arial"/>
-                <a:cs typeface="Arial"/>
-              </a:rPr>
-              <a:t>‹#›</a:t>
-            </a:fld>
-            <a:endParaRPr sz="1200" b="0" i="0" u="none" strike="noStrike" cap="none">
-              <a:solidFill>
-                <a:schemeClr val="dk1"/>
-              </a:solidFill>
-              <a:latin typeface="Arial"/>
-              <a:ea typeface="Arial"/>
-              <a:cs typeface="Arial"/>
-            </a:endParaRPr>
-          </a:p>
-        </p:txBody>
-      </p:sp>
-    </p:spTree>
-  </p:cSld>
-  <p:clrMap bg1="lt1" tx1="dk1" bg2="dk2" tx2="lt2" accent1="accent1" accent2="accent2" accent3="accent3" accent4="accent4" accent5="accent5" accent6="accent6" hlink="hlink" folHlink="folHlink"/>
-  <p:notesStyle>
-    <a:defPPr marR="0" lvl="0" algn="l">
-      <a:lnSpc>
-        <a:spcPct val="100000"/>
-      </a:lnSpc>
-      <a:spcBef>
-        <a:spcPts val="0"/>
-      </a:spcBef>
-      <a:spcAft>
-        <a:spcPts val="0"/>
-      </a:spcAft>
-    </a:defPPr>
-    <a:lvl1pPr marR="0" lvl="0" algn="l">
-      <a:lnSpc>
-        <a:spcPct val="100000"/>
-      </a:lnSpc>
-      <a:spcBef>
-        <a:spcPts val="0"/>
-      </a:spcBef>
-      <a:spcAft>
-        <a:spcPts val="0"/>
-      </a:spcAft>
-      <a:buClr>
-        <a:srgbClr val="000000"/>
-      </a:buClr>
-      <a:buFont typeface="Arial"/>
-      <a:defRPr sz="1400" b="0" i="0" u="none" strike="noStrike" cap="none">
-        <a:solidFill>
-          <a:srgbClr val="000000"/>
-        </a:solidFill>
-        <a:latin typeface="Arial"/>
-        <a:ea typeface="Arial"/>
-        <a:cs typeface="Arial"/>
-      </a:defRPr>
-    </a:lvl1pPr>
-    <a:lvl2pPr marR="0" lvl="1" algn="l">
-      <a:lnSpc>
-        <a:spcPct val="100000"/>
-      </a:lnSpc>
-      <a:spcBef>
-        <a:spcPts val="0"/>
-      </a:spcBef>
-      <a:spcAft>
-        <a:spcPts val="0"/>
-      </a:spcAft>
-      <a:buClr>
-        <a:srgbClr val="000000"/>
-      </a:buClr>
-      <a:buFont typeface="Arial"/>
-      <a:defRPr sz="1400" b="0" i="0" u="none" strike="noStrike" cap="none">
-        <a:solidFill>
-          <a:srgbClr val="000000"/>
-        </a:solidFill>
-        <a:latin typeface="Arial"/>
-        <a:ea typeface="Arial"/>
-        <a:cs typeface="Arial"/>
-      </a:defRPr>
-    </a:lvl2pPr>
-    <a:lvl3pPr marR="0" lvl="2" algn="l">
-      <a:lnSpc>
-        <a:spcPct val="100000"/>
-      </a:lnSpc>
-      <a:spcBef>
-        <a:spcPts val="0"/>
-      </a:spcBef>
-      <a:spcAft>
-        <a:spcPts val="0"/>
-      </a:spcAft>
-      <a:buClr>
-        <a:srgbClr val="000000"/>
-      </a:buClr>
-      <a:buFont typeface="Arial"/>
-      <a:defRPr sz="1400" b="0" i="0" u="none" strike="noStrike" cap="none">
-        <a:solidFill>
-          <a:srgbClr val="000000"/>
-        </a:solidFill>
-        <a:latin typeface="Arial"/>
-        <a:ea typeface="Arial"/>
-        <a:cs typeface="Arial"/>
-      </a:defRPr>
-    </a:lvl3pPr>
-    <a:lvl4pPr marR="0" lvl="3" algn="l">
-      <a:lnSpc>
-        <a:spcPct val="100000"/>
-      </a:lnSpc>
-      <a:spcBef>
-        <a:spcPts val="0"/>
-      </a:spcBef>
-      <a:spcAft>
-        <a:spcPts val="0"/>
-      </a:spcAft>
-      <a:buClr>
-        <a:srgbClr val="000000"/>
-      </a:buClr>
-      <a:buFont typeface="Arial"/>
-      <a:defRPr sz="1400" b="0" i="0" u="none" strike="noStrike" cap="none">
-        <a:solidFill>
-          <a:srgbClr val="000000"/>
-        </a:solidFill>
-        <a:latin typeface="Arial"/>
-        <a:ea typeface="Arial"/>
-        <a:cs typeface="Arial"/>
-      </a:defRPr>
-    </a:lvl4pPr>
-    <a:lvl5pPr marR="0" lvl="4" algn="l">
-      <a:lnSpc>
-        <a:spcPct val="100000"/>
-      </a:lnSpc>
-      <a:spcBef>
-        <a:spcPts val="0"/>
-      </a:spcBef>
-      <a:spcAft>
-        <a:spcPts val="0"/>
-      </a:spcAft>
-      <a:buClr>
-        <a:srgbClr val="000000"/>
-      </a:buClr>
-      <a:buFont typeface="Arial"/>
-      <a:defRPr sz="1400" b="0" i="0" u="none" strike="noStrike" cap="none">
-        <a:solidFill>
-          <a:srgbClr val="000000"/>
-        </a:solidFill>
-        <a:latin typeface="Arial"/>
-        <a:ea typeface="Arial"/>
-        <a:cs typeface="Arial"/>
-      </a:defRPr>
-    </a:lvl5pPr>
-    <a:lvl6pPr marR="0" lvl="5" algn="l">
-      <a:lnSpc>
-        <a:spcPct val="100000"/>
-      </a:lnSpc>
-      <a:spcBef>
-        <a:spcPts val="0"/>
-      </a:spcBef>
-      <a:spcAft>
-        <a:spcPts val="0"/>
-      </a:spcAft>
-      <a:buClr>
-        <a:srgbClr val="000000"/>
-      </a:buClr>
-      <a:buFont typeface="Arial"/>
-      <a:defRPr sz="1400" b="0" i="0" u="none" strike="noStrike" cap="none">
-        <a:solidFill>
-          <a:srgbClr val="000000"/>
-        </a:solidFill>
-        <a:latin typeface="Arial"/>
-        <a:ea typeface="Arial"/>
-        <a:cs typeface="Arial"/>
-      </a:defRPr>
-    </a:lvl6pPr>
-    <a:lvl7pPr marR="0" lvl="6" algn="l">
-      <a:lnSpc>
-        <a:spcPct val="100000"/>
-      </a:lnSpc>
-      <a:spcBef>
-        <a:spcPts val="0"/>
-      </a:spcBef>
-      <a:spcAft>
-        <a:spcPts val="0"/>
-      </a:spcAft>
-      <a:buClr>
-        <a:srgbClr val="000000"/>
-      </a:buClr>
-      <a:buFont typeface="Arial"/>
-      <a:defRPr sz="1400" b="0" i="0" u="none" strike="noStrike" cap="none">
-        <a:solidFill>
-          <a:srgbClr val="000000"/>
-        </a:solidFill>
-        <a:latin typeface="Arial"/>
-        <a:ea typeface="Arial"/>
-        <a:cs typeface="Arial"/>
-      </a:defRPr>
-    </a:lvl7pPr>
-    <a:lvl8pPr marR="0" lvl="7" algn="l">
-      <a:lnSpc>
-        <a:spcPct val="100000"/>
-      </a:lnSpc>
-      <a:spcBef>
-        <a:spcPts val="0"/>
-      </a:spcBef>
-      <a:spcAft>
-        <a:spcPts val="0"/>
-      </a:spcAft>
-      <a:buClr>
-        <a:srgbClr val="000000"/>
-      </a:buClr>
-      <a:buFont typeface="Arial"/>
-      <a:defRPr sz="1400" b="0" i="0" u="none" strike="noStrike" cap="none">
-        <a:solidFill>
-          <a:srgbClr val="000000"/>
-        </a:solidFill>
-        <a:latin typeface="Arial"/>
-        <a:ea typeface="Arial"/>
-        <a:cs typeface="Arial"/>
-      </a:defRPr>
-    </a:lvl8pPr>
-    <a:lvl9pPr marR="0" lvl="8" algn="l">
-      <a:lnSpc>
-        <a:spcPct val="100000"/>
-      </a:lnSpc>
-      <a:spcBef>
-        <a:spcPts val="0"/>
-      </a:spcBef>
-      <a:spcAft>
-        <a:spcPts val="0"/>
-      </a:spcAft>
-      <a:buClr>
-        <a:srgbClr val="000000"/>
-      </a:buClr>
-      <a:buFont typeface="Arial"/>
-      <a:defRPr sz="1400" b="0" i="0" u="none" strike="noStrike" cap="none">
-        <a:solidFill>
-          <a:srgbClr val="000000"/>
-        </a:solidFill>
-        <a:latin typeface="Arial"/>
-        <a:ea typeface="Arial"/>
-        <a:cs typeface="Arial"/>
-      </a:defRPr>
-    </a:lvl9pPr>
-  </p:notesStyle>
-</p:notesMaster>
-</file>
-
-<file path=ppt/notesSlides/notesSlide1.xml><?xml version="1.0" encoding="utf-8"?>
-<p:notes xmlns:a="http://schemas.openxmlformats.org/drawingml/2006/main" xmlns:r="http://schemas.openxmlformats.org/officeDocument/2006/relationships" xmlns:p="http://schemas.openxmlformats.org/presentationml/2006/main" xmlns:m="http://schemas.openxmlformats.org/officeDocument/2006/math" xmlns:w="http://schemas.openxmlformats.org/wordprocessingml/2006/main" showMasterPhAnim="0" showMasterSp="0">
-  <p:cSld name="">
-    <p:spTree>
-      <p:nvGrpSpPr>
-        <p:cNvPr id="1" name=""/>
-        <p:cNvGrpSpPr/>
-        <p:nvPr/>
-      </p:nvGrpSpPr>
-      <p:grpSpPr bwMode="auto">
-        <a:xfrm>
-          <a:off x="0" y="0"/>
-          <a:ext cx="0" cy="0"/>
-          <a:chOff x="0" y="0"/>
-          <a:chExt cx="0" cy="0"/>
-        </a:xfrm>
-      </p:grpSpPr>
-      <p:sp>
-        <p:nvSpPr>
-          <p:cNvPr id="341" name="Google Shape;341;p1:notes"/>
-          <p:cNvSpPr/>
-          <p:nvPr>
-            <p:ph type="sldImg" idx="2"/>
-          </p:nvPr>
-        </p:nvSpPr>
-        <p:spPr bwMode="auto">
-          <a:xfrm>
-            <a:off x="685800" y="1143000"/>
-            <a:ext cx="5486400" cy="3086100"/>
-          </a:xfrm>
-          <a:custGeom>
-            <a:avLst/>
-            <a:gdLst/>
-            <a:ahLst/>
-            <a:cxnLst/>
-            <a:rect l="l" t="t" r="r" b="b"/>
-            <a:pathLst>
-              <a:path w="120000" h="120000" fill="norm" stroke="1" extrusionOk="0">
-                <a:moveTo>
-                  <a:pt x="0" y="0"/>
-                </a:moveTo>
-                <a:lnTo>
-                  <a:pt x="120000" y="0"/>
-                </a:lnTo>
-                <a:lnTo>
-                  <a:pt x="120000" y="120000"/>
-                </a:lnTo>
-                <a:lnTo>
-                  <a:pt x="0" y="120000"/>
-                </a:lnTo>
-                <a:close/>
-              </a:path>
-            </a:pathLst>
-          </a:custGeom>
-          <a:noFill/>
-          <a:ln w="12700" cap="flat" cmpd="sng">
-            <a:solidFill>
-              <a:srgbClr val="000000"/>
-            </a:solidFill>
-            <a:prstDash val="solid"/>
-            <a:round/>
-            <a:headEnd type="none" w="sm" len="sm"/>
-            <a:tailEnd type="none" w="sm" len="sm"/>
-          </a:ln>
-        </p:spPr>
-      </p:sp>
-      <p:sp>
-        <p:nvSpPr>
-          <p:cNvPr id="342" name="Google Shape;342;p1:notes"/>
-          <p:cNvSpPr txBox="1"/>
-          <p:nvPr>
-            <p:ph type="body" idx="1"/>
-          </p:nvPr>
-        </p:nvSpPr>
-        <p:spPr bwMode="auto">
-          <a:xfrm>
-            <a:off x="685800" y="4400550"/>
-            <a:ext cx="5486400" cy="3600450"/>
-          </a:xfrm>
-          <a:prstGeom prst="rect">
-            <a:avLst/>
-          </a:prstGeom>
-          <a:noFill/>
-          <a:ln>
-            <a:noFill/>
-          </a:ln>
-        </p:spPr>
-        <p:txBody>
-          <a:bodyPr spcFirstLastPara="1" wrap="square" lIns="91425" tIns="45700" rIns="91425" bIns="45700" anchor="t" anchorCtr="0">
-            <a:noAutofit/>
-          </a:bodyPr>
-          <a:lstStyle/>
-          <a:p>
-            <a:pPr marL="0" lvl="0" indent="0" algn="l">
-              <a:spcBef>
-                <a:spcPts val="0"/>
-              </a:spcBef>
-              <a:spcAft>
-                <a:spcPts val="0"/>
-              </a:spcAft>
-              <a:buNone/>
-              <a:defRPr/>
-            </a:pPr>
-            <a:endParaRPr>
-              <a:latin typeface="Arial"/>
-              <a:ea typeface="Arial"/>
-              <a:cs typeface="Arial"/>
-            </a:endParaRPr>
-          </a:p>
-        </p:txBody>
-      </p:sp>
-      <p:sp>
-        <p:nvSpPr>
-          <p:cNvPr id="343" name="Google Shape;343;p1:notes"/>
-          <p:cNvSpPr txBox="1"/>
-          <p:nvPr>
-            <p:ph type="sldNum" idx="12"/>
-          </p:nvPr>
-        </p:nvSpPr>
-        <p:spPr bwMode="auto">
-          <a:xfrm>
-            <a:off x="3884613" y="8685213"/>
-            <a:ext cx="2971800" cy="458787"/>
-          </a:xfrm>
-          <a:prstGeom prst="rect">
-            <a:avLst/>
-          </a:prstGeom>
-          <a:noFill/>
-          <a:ln>
-            <a:noFill/>
-          </a:ln>
-        </p:spPr>
-        <p:txBody>
-          <a:bodyPr spcFirstLastPara="1" wrap="square" lIns="91425" tIns="45700" rIns="91425" bIns="45700" anchor="b" anchorCtr="0">
-            <a:noAutofit/>
-          </a:bodyPr>
-          <a:lstStyle/>
-          <a:p>
-            <a:pPr marL="0" lvl="0" indent="0" algn="r">
-              <a:spcBef>
-                <a:spcPts val="0"/>
-              </a:spcBef>
-              <a:spcAft>
-                <a:spcPts val="0"/>
-              </a:spcAft>
-              <a:buNone/>
-              <a:defRPr/>
-            </a:pPr>
-            <a:fld id="{00000000-1234-1234-1234-123412341234}" type="slidenum">
-              <a:rPr lang="en-US"/>
-              <a:t>‹#›</a:t>
-            </a:fld>
-            <a:endParaRPr/>
-          </a:p>
-        </p:txBody>
-      </p:sp>
-    </p:spTree>
-  </p:cSld>
-</p:notes>
-</file>
-
-<file path=ppt/notesSlides/notesSlide10.xml><?xml version="1.0" encoding="utf-8"?>
-<p:notes xmlns:a="http://schemas.openxmlformats.org/drawingml/2006/main" xmlns:r="http://schemas.openxmlformats.org/officeDocument/2006/relationships" xmlns:p="http://schemas.openxmlformats.org/presentationml/2006/main" xmlns:m="http://schemas.openxmlformats.org/officeDocument/2006/math" xmlns:w="http://schemas.openxmlformats.org/wordprocessingml/2006/main" showMasterPhAnim="0" showMasterSp="0">
-  <p:cSld name="">
-    <p:spTree>
-      <p:nvGrpSpPr>
-        <p:cNvPr id="1" name=""/>
-        <p:cNvGrpSpPr/>
-        <p:nvPr/>
-      </p:nvGrpSpPr>
-      <p:grpSpPr bwMode="auto">
-        <a:xfrm>
-          <a:off x="0" y="0"/>
-          <a:ext cx="0" cy="0"/>
-          <a:chOff x="0" y="0"/>
-          <a:chExt cx="0" cy="0"/>
-        </a:xfrm>
-      </p:grpSpPr>
-      <p:sp>
-        <p:nvSpPr>
-          <p:cNvPr id="415" name="Google Shape;415;p10:notes"/>
-          <p:cNvSpPr/>
-          <p:nvPr>
-            <p:ph type="sldImg" idx="2"/>
-          </p:nvPr>
-        </p:nvSpPr>
-        <p:spPr bwMode="auto">
-          <a:xfrm>
-            <a:off x="685800" y="1143000"/>
-            <a:ext cx="5486400" cy="3086100"/>
-          </a:xfrm>
-          <a:custGeom>
-            <a:avLst/>
-            <a:gdLst/>
-            <a:ahLst/>
-            <a:cxnLst/>
-            <a:rect l="l" t="t" r="r" b="b"/>
-            <a:pathLst>
-              <a:path w="120000" h="120000" fill="norm" stroke="1" extrusionOk="0">
-                <a:moveTo>
-                  <a:pt x="0" y="0"/>
-                </a:moveTo>
-                <a:lnTo>
-                  <a:pt x="120000" y="0"/>
-                </a:lnTo>
-                <a:lnTo>
-                  <a:pt x="120000" y="120000"/>
-                </a:lnTo>
-                <a:lnTo>
-                  <a:pt x="0" y="120000"/>
-                </a:lnTo>
-                <a:close/>
-              </a:path>
-            </a:pathLst>
-          </a:custGeom>
-          <a:noFill/>
-          <a:ln w="12700" cap="flat" cmpd="sng">
-            <a:solidFill>
-              <a:srgbClr val="000000"/>
-            </a:solidFill>
-            <a:prstDash val="solid"/>
-            <a:round/>
-            <a:headEnd type="none" w="sm" len="sm"/>
-            <a:tailEnd type="none" w="sm" len="sm"/>
-          </a:ln>
-        </p:spPr>
-      </p:sp>
-      <p:sp>
-        <p:nvSpPr>
-          <p:cNvPr id="416" name="Google Shape;416;p10:notes"/>
-          <p:cNvSpPr txBox="1"/>
-          <p:nvPr>
-            <p:ph type="body" idx="1"/>
-          </p:nvPr>
-        </p:nvSpPr>
-        <p:spPr bwMode="auto">
-          <a:xfrm>
-            <a:off x="685800" y="4400550"/>
-            <a:ext cx="5486400" cy="3600450"/>
-          </a:xfrm>
-          <a:prstGeom prst="rect">
-            <a:avLst/>
-          </a:prstGeom>
-          <a:noFill/>
-          <a:ln>
-            <a:noFill/>
-          </a:ln>
-        </p:spPr>
-        <p:txBody>
-          <a:bodyPr spcFirstLastPara="1" wrap="square" lIns="91425" tIns="45700" rIns="91425" bIns="45700" anchor="t" anchorCtr="0">
-            <a:noAutofit/>
-          </a:bodyPr>
-          <a:lstStyle/>
-          <a:p>
-            <a:pPr marL="0" lvl="0" indent="0" algn="l">
-              <a:spcBef>
-                <a:spcPts val="0"/>
-              </a:spcBef>
-              <a:spcAft>
-                <a:spcPts val="0"/>
-              </a:spcAft>
-              <a:buNone/>
-              <a:defRPr/>
-            </a:pPr>
-            <a:endParaRPr/>
-          </a:p>
-        </p:txBody>
-      </p:sp>
-      <p:sp>
-        <p:nvSpPr>
-          <p:cNvPr id="417" name="Google Shape;417;p10:notes"/>
-          <p:cNvSpPr txBox="1"/>
-          <p:nvPr>
-            <p:ph type="sldNum" idx="12"/>
-          </p:nvPr>
-        </p:nvSpPr>
-        <p:spPr bwMode="auto">
-          <a:xfrm>
-            <a:off x="3884613" y="8685213"/>
-            <a:ext cx="2971800" cy="458787"/>
-          </a:xfrm>
-          <a:prstGeom prst="rect">
-            <a:avLst/>
-          </a:prstGeom>
-          <a:noFill/>
-          <a:ln>
-            <a:noFill/>
-          </a:ln>
-        </p:spPr>
-        <p:txBody>
-          <a:bodyPr spcFirstLastPara="1" wrap="square" lIns="91425" tIns="45700" rIns="91425" bIns="45700" anchor="b" anchorCtr="0">
-            <a:noAutofit/>
-          </a:bodyPr>
-          <a:lstStyle/>
-          <a:p>
-            <a:pPr marL="0" lvl="0" indent="0" algn="r">
-              <a:spcBef>
-                <a:spcPts val="0"/>
-              </a:spcBef>
-              <a:spcAft>
-                <a:spcPts val="0"/>
-              </a:spcAft>
-              <a:buNone/>
-              <a:defRPr/>
-            </a:pPr>
-            <a:fld id="{00000000-1234-1234-1234-123412341234}" type="slidenum">
-              <a:rPr lang="en-US"/>
-              <a:t>‹#›</a:t>
-            </a:fld>
-            <a:endParaRPr/>
-          </a:p>
-        </p:txBody>
-      </p:sp>
-    </p:spTree>
-  </p:cSld>
-</p:notes>
-</file>
-
-<file path=ppt/notesSlides/notesSlide11.xml><?xml version="1.0" encoding="utf-8"?>
-<p:notes xmlns:a="http://schemas.openxmlformats.org/drawingml/2006/main" xmlns:r="http://schemas.openxmlformats.org/officeDocument/2006/relationships" xmlns:p="http://schemas.openxmlformats.org/presentationml/2006/main" xmlns:m="http://schemas.openxmlformats.org/officeDocument/2006/math" xmlns:w="http://schemas.openxmlformats.org/wordprocessingml/2006/main" showMasterPhAnim="0" showMasterSp="0">
-  <p:cSld name="">
-    <p:spTree>
-      <p:nvGrpSpPr>
-        <p:cNvPr id="1" name=""/>
-        <p:cNvGrpSpPr/>
-        <p:nvPr/>
-      </p:nvGrpSpPr>
-      <p:grpSpPr bwMode="auto">
-        <a:xfrm>
-          <a:off x="0" y="0"/>
-          <a:ext cx="0" cy="0"/>
-          <a:chOff x="0" y="0"/>
-          <a:chExt cx="0" cy="0"/>
-        </a:xfrm>
-      </p:grpSpPr>
-      <p:sp>
-        <p:nvSpPr>
-          <p:cNvPr id="424" name="Google Shape;424;p11:notes"/>
-          <p:cNvSpPr/>
-          <p:nvPr>
-            <p:ph type="sldImg" idx="2"/>
-          </p:nvPr>
-        </p:nvSpPr>
-        <p:spPr bwMode="auto">
-          <a:xfrm>
-            <a:off x="685800" y="1143000"/>
-            <a:ext cx="5486400" cy="3086100"/>
-          </a:xfrm>
-          <a:custGeom>
-            <a:avLst/>
-            <a:gdLst/>
-            <a:ahLst/>
-            <a:cxnLst/>
-            <a:rect l="l" t="t" r="r" b="b"/>
-            <a:pathLst>
-              <a:path w="120000" h="120000" fill="norm" stroke="1" extrusionOk="0">
-                <a:moveTo>
-                  <a:pt x="0" y="0"/>
-                </a:moveTo>
-                <a:lnTo>
-                  <a:pt x="120000" y="0"/>
-                </a:lnTo>
-                <a:lnTo>
-                  <a:pt x="120000" y="120000"/>
-                </a:lnTo>
-                <a:lnTo>
-                  <a:pt x="0" y="120000"/>
-                </a:lnTo>
-                <a:close/>
-              </a:path>
-            </a:pathLst>
-          </a:custGeom>
-          <a:noFill/>
-          <a:ln w="12700" cap="flat" cmpd="sng">
-            <a:solidFill>
-              <a:srgbClr val="000000"/>
-            </a:solidFill>
-            <a:prstDash val="solid"/>
-            <a:round/>
-            <a:headEnd type="none" w="sm" len="sm"/>
-            <a:tailEnd type="none" w="sm" len="sm"/>
-          </a:ln>
-        </p:spPr>
-      </p:sp>
-      <p:sp>
-        <p:nvSpPr>
-          <p:cNvPr id="425" name="Google Shape;425;p11:notes"/>
-          <p:cNvSpPr txBox="1"/>
-          <p:nvPr>
-            <p:ph type="body" idx="1"/>
-          </p:nvPr>
-        </p:nvSpPr>
-        <p:spPr bwMode="auto">
-          <a:xfrm>
-            <a:off x="685800" y="4400550"/>
-            <a:ext cx="5486400" cy="3600450"/>
-          </a:xfrm>
-          <a:prstGeom prst="rect">
-            <a:avLst/>
-          </a:prstGeom>
-          <a:noFill/>
-          <a:ln>
-            <a:noFill/>
-          </a:ln>
-        </p:spPr>
-        <p:txBody>
-          <a:bodyPr spcFirstLastPara="1" wrap="square" lIns="91425" tIns="45700" rIns="91425" bIns="45700" anchor="t" anchorCtr="0">
-            <a:noAutofit/>
-          </a:bodyPr>
-          <a:lstStyle/>
-          <a:p>
-            <a:pPr marL="0" lvl="0" indent="0" algn="l">
-              <a:spcBef>
-                <a:spcPts val="0"/>
-              </a:spcBef>
-              <a:spcAft>
-                <a:spcPts val="0"/>
-              </a:spcAft>
-              <a:buNone/>
-              <a:defRPr/>
-            </a:pPr>
-            <a:endParaRPr/>
-          </a:p>
-        </p:txBody>
-      </p:sp>
-      <p:sp>
-        <p:nvSpPr>
-          <p:cNvPr id="426" name="Google Shape;426;p11:notes"/>
-          <p:cNvSpPr txBox="1"/>
-          <p:nvPr>
-            <p:ph type="sldNum" idx="12"/>
-          </p:nvPr>
-        </p:nvSpPr>
-        <p:spPr bwMode="auto">
-          <a:xfrm>
-            <a:off x="3884613" y="8685213"/>
-            <a:ext cx="2971800" cy="458787"/>
-          </a:xfrm>
-          <a:prstGeom prst="rect">
-            <a:avLst/>
-          </a:prstGeom>
-          <a:noFill/>
-          <a:ln>
-            <a:noFill/>
-          </a:ln>
-        </p:spPr>
-        <p:txBody>
-          <a:bodyPr spcFirstLastPara="1" wrap="square" lIns="91425" tIns="45700" rIns="91425" bIns="45700" anchor="b" anchorCtr="0">
-            <a:noAutofit/>
-          </a:bodyPr>
-          <a:lstStyle/>
-          <a:p>
-            <a:pPr marL="0" lvl="0" indent="0" algn="r">
-              <a:spcBef>
-                <a:spcPts val="0"/>
-              </a:spcBef>
-              <a:spcAft>
-                <a:spcPts val="0"/>
-              </a:spcAft>
-              <a:buNone/>
-              <a:defRPr/>
-            </a:pPr>
-            <a:fld id="{00000000-1234-1234-1234-123412341234}" type="slidenum">
-              <a:rPr lang="en-US"/>
-              <a:t>‹#›</a:t>
-            </a:fld>
-            <a:endParaRPr/>
-          </a:p>
-        </p:txBody>
-      </p:sp>
-    </p:spTree>
-  </p:cSld>
-</p:notes>
-</file>
-
-<file path=ppt/notesSlides/notesSlide12.xml><?xml version="1.0" encoding="utf-8"?>
-<p:notes xmlns:a="http://schemas.openxmlformats.org/drawingml/2006/main" xmlns:r="http://schemas.openxmlformats.org/officeDocument/2006/relationships" xmlns:p="http://schemas.openxmlformats.org/presentationml/2006/main" xmlns:m="http://schemas.openxmlformats.org/officeDocument/2006/math" xmlns:w="http://schemas.openxmlformats.org/wordprocessingml/2006/main" showMasterPhAnim="0" showMasterSp="0">
-  <p:cSld name="">
-    <p:spTree>
-      <p:nvGrpSpPr>
-        <p:cNvPr id="1" name=""/>
-        <p:cNvGrpSpPr/>
-        <p:nvPr/>
-      </p:nvGrpSpPr>
-      <p:grpSpPr bwMode="auto">
-        <a:xfrm>
-          <a:off x="0" y="0"/>
-          <a:ext cx="0" cy="0"/>
-          <a:chOff x="0" y="0"/>
-          <a:chExt cx="0" cy="0"/>
-        </a:xfrm>
-      </p:grpSpPr>
-      <p:sp>
-        <p:nvSpPr>
-          <p:cNvPr id="431" name="Google Shape;431;p12:notes"/>
-          <p:cNvSpPr/>
-          <p:nvPr>
-            <p:ph type="sldImg" idx="2"/>
-          </p:nvPr>
-        </p:nvSpPr>
-        <p:spPr bwMode="auto">
-          <a:xfrm>
-            <a:off x="685800" y="1143000"/>
-            <a:ext cx="5486400" cy="3086100"/>
-          </a:xfrm>
-          <a:custGeom>
-            <a:avLst/>
-            <a:gdLst/>
-            <a:ahLst/>
-            <a:cxnLst/>
-            <a:rect l="l" t="t" r="r" b="b"/>
-            <a:pathLst>
-              <a:path w="120000" h="120000" fill="norm" stroke="1" extrusionOk="0">
-                <a:moveTo>
-                  <a:pt x="0" y="0"/>
-                </a:moveTo>
-                <a:lnTo>
-                  <a:pt x="120000" y="0"/>
-                </a:lnTo>
-                <a:lnTo>
-                  <a:pt x="120000" y="120000"/>
-                </a:lnTo>
-                <a:lnTo>
-                  <a:pt x="0" y="120000"/>
-                </a:lnTo>
-                <a:close/>
-              </a:path>
-            </a:pathLst>
-          </a:custGeom>
-          <a:noFill/>
-          <a:ln w="12700" cap="flat" cmpd="sng">
-            <a:solidFill>
-              <a:srgbClr val="000000"/>
-            </a:solidFill>
-            <a:prstDash val="solid"/>
-            <a:round/>
-            <a:headEnd type="none" w="sm" len="sm"/>
-            <a:tailEnd type="none" w="sm" len="sm"/>
-          </a:ln>
-        </p:spPr>
-      </p:sp>
-      <p:sp>
-        <p:nvSpPr>
-          <p:cNvPr id="432" name="Google Shape;432;p12:notes"/>
-          <p:cNvSpPr txBox="1"/>
-          <p:nvPr>
-            <p:ph type="body" idx="1"/>
-          </p:nvPr>
-        </p:nvSpPr>
-        <p:spPr bwMode="auto">
-          <a:xfrm>
-            <a:off x="685800" y="4400550"/>
-            <a:ext cx="5486400" cy="3600450"/>
-          </a:xfrm>
-          <a:prstGeom prst="rect">
-            <a:avLst/>
-          </a:prstGeom>
-          <a:noFill/>
-          <a:ln>
-            <a:noFill/>
-          </a:ln>
-        </p:spPr>
-        <p:txBody>
-          <a:bodyPr spcFirstLastPara="1" wrap="square" lIns="91425" tIns="45700" rIns="91425" bIns="45700" anchor="t" anchorCtr="0">
-            <a:noAutofit/>
-          </a:bodyPr>
-          <a:lstStyle/>
-          <a:p>
-            <a:pPr marL="0" lvl="0" indent="0" algn="l">
-              <a:spcBef>
-                <a:spcPts val="0"/>
-              </a:spcBef>
-              <a:spcAft>
-                <a:spcPts val="0"/>
-              </a:spcAft>
-              <a:buNone/>
-              <a:defRPr/>
-            </a:pPr>
-            <a:endParaRPr/>
-          </a:p>
-        </p:txBody>
-      </p:sp>
-      <p:sp>
-        <p:nvSpPr>
-          <p:cNvPr id="433" name="Google Shape;433;p12:notes"/>
-          <p:cNvSpPr txBox="1"/>
-          <p:nvPr>
-            <p:ph type="sldNum" idx="12"/>
-          </p:nvPr>
-        </p:nvSpPr>
-        <p:spPr bwMode="auto">
-          <a:xfrm>
-            <a:off x="3884613" y="8685213"/>
-            <a:ext cx="2971800" cy="458787"/>
-          </a:xfrm>
-          <a:prstGeom prst="rect">
-            <a:avLst/>
-          </a:prstGeom>
-          <a:noFill/>
-          <a:ln>
-            <a:noFill/>
-          </a:ln>
-        </p:spPr>
-        <p:txBody>
-          <a:bodyPr spcFirstLastPara="1" wrap="square" lIns="91425" tIns="45700" rIns="91425" bIns="45700" anchor="b" anchorCtr="0">
-            <a:noAutofit/>
-          </a:bodyPr>
-          <a:lstStyle/>
-          <a:p>
-            <a:pPr marL="0" lvl="0" indent="0" algn="r">
-              <a:spcBef>
-                <a:spcPts val="0"/>
-              </a:spcBef>
-              <a:spcAft>
-                <a:spcPts val="0"/>
-              </a:spcAft>
-              <a:buNone/>
-              <a:defRPr/>
-            </a:pPr>
-            <a:fld id="{00000000-1234-1234-1234-123412341234}" type="slidenum">
-              <a:rPr lang="en-US"/>
-              <a:t>‹#›</a:t>
-            </a:fld>
-            <a:endParaRPr/>
-          </a:p>
-        </p:txBody>
-      </p:sp>
-    </p:spTree>
-  </p:cSld>
-</p:notes>
-</file>
-
-<file path=ppt/notesSlides/notesSlide13.xml><?xml version="1.0" encoding="utf-8"?>
-<p:notes xmlns:a="http://schemas.openxmlformats.org/drawingml/2006/main" xmlns:r="http://schemas.openxmlformats.org/officeDocument/2006/relationships" xmlns:p="http://schemas.openxmlformats.org/presentationml/2006/main" xmlns:m="http://schemas.openxmlformats.org/officeDocument/2006/math" xmlns:w="http://schemas.openxmlformats.org/wordprocessingml/2006/main">
-  <p:cSld name="">
-    <p:spTree>
-      <p:nvGrpSpPr>
-        <p:cNvPr id="1" name=""/>
-        <p:cNvGrpSpPr/>
-        <p:nvPr/>
-      </p:nvGrpSpPr>
-      <p:grpSpPr bwMode="auto">
-        <a:xfrm>
-          <a:off x="0" y="0"/>
-          <a:ext cx="0" cy="0"/>
-          <a:chOff x="0" y="0"/>
-          <a:chExt cx="0" cy="0"/>
-        </a:xfrm>
-      </p:grpSpPr>
-      <p:sp>
-        <p:nvSpPr>
-          <p:cNvPr id="2" name="Slide Image Placeholder 1"/>
-          <p:cNvSpPr>
-            <a:spLocks noChangeAspect="1" noGrp="1" noRot="1"/>
-          </p:cNvSpPr>
-          <p:nvPr>
-            <p:ph type="sldImg"/>
-          </p:nvPr>
-        </p:nvSpPr>
-        <p:spPr bwMode="auto"/>
-      </p:sp>
-      <p:sp>
-        <p:nvSpPr>
-          <p:cNvPr id="3" name="Notes Placeholder 2"/>
-          <p:cNvSpPr>
-            <a:spLocks noGrp="1"/>
-          </p:cNvSpPr>
-          <p:nvPr>
-            <p:ph type="body" idx="1"/>
-          </p:nvPr>
-        </p:nvSpPr>
-        <p:spPr bwMode="auto"/>
-        <p:txBody>
-          <a:bodyPr/>
-          <a:lstStyle/>
-          <a:p>
-            <a:pPr>
-              <a:defRPr/>
-            </a:pPr>
-            <a:endParaRPr/>
-          </a:p>
-        </p:txBody>
-      </p:sp>
-      <p:sp>
-        <p:nvSpPr>
-          <p:cNvPr id="4" name="Slide Number Placeholder 3"/>
-          <p:cNvSpPr>
-            <a:spLocks noGrp="1"/>
-          </p:cNvSpPr>
-          <p:nvPr>
-            <p:ph type="sldNum" sz="quarter" idx="10"/>
-          </p:nvPr>
-        </p:nvSpPr>
-        <p:spPr bwMode="auto"/>
-        <p:txBody>
-          <a:bodyPr/>
-          <a:lstStyle/>
-          <a:p>
-            <a:pPr>
-              <a:defRPr/>
-            </a:pPr>
-            <a:fld id="{3CEA9B13-73A4-9F5B-B562-4E5737AB1495}" type="slidenum">
-              <a:rPr/>
-              <a:t/>
-            </a:fld>
-            <a:endParaRPr/>
-          </a:p>
-        </p:txBody>
-      </p:sp>
-    </p:spTree>
-  </p:cSld>
-</p:notes>
-</file>
-
-<file path=ppt/notesSlides/notesSlide2.xml><?xml version="1.0" encoding="utf-8"?>
-<p:notes xmlns:a="http://schemas.openxmlformats.org/drawingml/2006/main" xmlns:r="http://schemas.openxmlformats.org/officeDocument/2006/relationships" xmlns:p="http://schemas.openxmlformats.org/presentationml/2006/main" xmlns:m="http://schemas.openxmlformats.org/officeDocument/2006/math" xmlns:w="http://schemas.openxmlformats.org/wordprocessingml/2006/main" showMasterPhAnim="0" showMasterSp="0">
-  <p:cSld name="">
-    <p:spTree>
-      <p:nvGrpSpPr>
-        <p:cNvPr id="1" name=""/>
-        <p:cNvGrpSpPr/>
-        <p:nvPr/>
-      </p:nvGrpSpPr>
-      <p:grpSpPr bwMode="auto">
-        <a:xfrm>
-          <a:off x="0" y="0"/>
-          <a:ext cx="0" cy="0"/>
-          <a:chOff x="0" y="0"/>
-          <a:chExt cx="0" cy="0"/>
-        </a:xfrm>
-      </p:grpSpPr>
-      <p:sp>
-        <p:nvSpPr>
-          <p:cNvPr id="348" name="Google Shape;348;p2:notes"/>
-          <p:cNvSpPr/>
-          <p:nvPr>
-            <p:ph type="sldImg" idx="2"/>
-          </p:nvPr>
-        </p:nvSpPr>
-        <p:spPr bwMode="auto">
-          <a:xfrm>
-            <a:off x="685800" y="1143000"/>
-            <a:ext cx="5486400" cy="3086100"/>
-          </a:xfrm>
-          <a:custGeom>
-            <a:avLst/>
-            <a:gdLst/>
-            <a:ahLst/>
-            <a:cxnLst/>
-            <a:rect l="l" t="t" r="r" b="b"/>
-            <a:pathLst>
-              <a:path w="120000" h="120000" fill="norm" stroke="1" extrusionOk="0">
-                <a:moveTo>
-                  <a:pt x="0" y="0"/>
-                </a:moveTo>
-                <a:lnTo>
-                  <a:pt x="120000" y="0"/>
-                </a:lnTo>
-                <a:lnTo>
-                  <a:pt x="120000" y="120000"/>
-                </a:lnTo>
-                <a:lnTo>
-                  <a:pt x="0" y="120000"/>
-                </a:lnTo>
-                <a:close/>
-              </a:path>
-            </a:pathLst>
-          </a:custGeom>
-          <a:noFill/>
-          <a:ln w="12700" cap="flat" cmpd="sng">
-            <a:solidFill>
-              <a:srgbClr val="000000"/>
-            </a:solidFill>
-            <a:prstDash val="solid"/>
-            <a:round/>
-            <a:headEnd type="none" w="sm" len="sm"/>
-            <a:tailEnd type="none" w="sm" len="sm"/>
-          </a:ln>
-        </p:spPr>
-      </p:sp>
-      <p:sp>
-        <p:nvSpPr>
-          <p:cNvPr id="349" name="Google Shape;349;p2:notes"/>
-          <p:cNvSpPr txBox="1"/>
-          <p:nvPr>
-            <p:ph type="body" idx="1"/>
-          </p:nvPr>
-        </p:nvSpPr>
-        <p:spPr bwMode="auto">
-          <a:xfrm>
-            <a:off x="685800" y="4400550"/>
-            <a:ext cx="5486400" cy="3600450"/>
-          </a:xfrm>
-          <a:prstGeom prst="rect">
-            <a:avLst/>
-          </a:prstGeom>
-          <a:noFill/>
-          <a:ln>
-            <a:noFill/>
-          </a:ln>
-        </p:spPr>
-        <p:txBody>
-          <a:bodyPr spcFirstLastPara="1" wrap="square" lIns="91425" tIns="45700" rIns="91425" bIns="45700" anchor="t" anchorCtr="0">
-            <a:noAutofit/>
-          </a:bodyPr>
-          <a:lstStyle/>
-          <a:p>
-            <a:pPr marL="0" lvl="0" indent="0" algn="l">
-              <a:spcBef>
-                <a:spcPts val="0"/>
-              </a:spcBef>
-              <a:spcAft>
-                <a:spcPts val="0"/>
-              </a:spcAft>
-              <a:buNone/>
-              <a:defRPr/>
-            </a:pPr>
-            <a:endParaRPr/>
-          </a:p>
-        </p:txBody>
-      </p:sp>
-      <p:sp>
-        <p:nvSpPr>
-          <p:cNvPr id="350" name="Google Shape;350;p2:notes"/>
-          <p:cNvSpPr txBox="1"/>
-          <p:nvPr>
-            <p:ph type="sldNum" idx="12"/>
-          </p:nvPr>
-        </p:nvSpPr>
-        <p:spPr bwMode="auto">
-          <a:xfrm>
-            <a:off x="3884613" y="8685213"/>
-            <a:ext cx="2971800" cy="458787"/>
-          </a:xfrm>
-          <a:prstGeom prst="rect">
-            <a:avLst/>
-          </a:prstGeom>
-          <a:noFill/>
-          <a:ln>
-            <a:noFill/>
-          </a:ln>
-        </p:spPr>
-        <p:txBody>
-          <a:bodyPr spcFirstLastPara="1" wrap="square" lIns="91425" tIns="45700" rIns="91425" bIns="45700" anchor="b" anchorCtr="0">
-            <a:noAutofit/>
-          </a:bodyPr>
-          <a:lstStyle/>
-          <a:p>
-            <a:pPr marL="0" lvl="0" indent="0" algn="r">
-              <a:spcBef>
-                <a:spcPts val="0"/>
-              </a:spcBef>
-              <a:spcAft>
-                <a:spcPts val="0"/>
-              </a:spcAft>
-              <a:buNone/>
-              <a:defRPr/>
-            </a:pPr>
-            <a:fld id="{00000000-1234-1234-1234-123412341234}" type="slidenum">
-              <a:rPr lang="en-US"/>
-              <a:t>‹#›</a:t>
-            </a:fld>
-            <a:endParaRPr/>
-          </a:p>
-        </p:txBody>
-      </p:sp>
-    </p:spTree>
-  </p:cSld>
-</p:notes>
-</file>
-
-<file path=ppt/notesSlides/notesSlide3.xml><?xml version="1.0" encoding="utf-8"?>
-<p:notes xmlns:a="http://schemas.openxmlformats.org/drawingml/2006/main" xmlns:r="http://schemas.openxmlformats.org/officeDocument/2006/relationships" xmlns:p="http://schemas.openxmlformats.org/presentationml/2006/main" xmlns:m="http://schemas.openxmlformats.org/officeDocument/2006/math" xmlns:w="http://schemas.openxmlformats.org/wordprocessingml/2006/main" showMasterPhAnim="0" showMasterSp="0">
-  <p:cSld name="">
-    <p:spTree>
-      <p:nvGrpSpPr>
-        <p:cNvPr id="1" name=""/>
-        <p:cNvGrpSpPr/>
-        <p:nvPr/>
-      </p:nvGrpSpPr>
-      <p:grpSpPr bwMode="auto">
-        <a:xfrm>
-          <a:off x="0" y="0"/>
-          <a:ext cx="0" cy="0"/>
-          <a:chOff x="0" y="0"/>
-          <a:chExt cx="0" cy="0"/>
-        </a:xfrm>
-      </p:grpSpPr>
-      <p:sp>
-        <p:nvSpPr>
-          <p:cNvPr id="355" name="Google Shape;355;p3:notes"/>
-          <p:cNvSpPr/>
-          <p:nvPr>
-            <p:ph type="sldImg" idx="2"/>
-          </p:nvPr>
-        </p:nvSpPr>
-        <p:spPr bwMode="auto">
-          <a:xfrm>
-            <a:off x="685800" y="1143000"/>
-            <a:ext cx="5486400" cy="3086100"/>
-          </a:xfrm>
-          <a:custGeom>
-            <a:avLst/>
-            <a:gdLst/>
-            <a:ahLst/>
-            <a:cxnLst/>
-            <a:rect l="l" t="t" r="r" b="b"/>
-            <a:pathLst>
-              <a:path w="120000" h="120000" fill="norm" stroke="1" extrusionOk="0">
-                <a:moveTo>
-                  <a:pt x="0" y="0"/>
-                </a:moveTo>
-                <a:lnTo>
-                  <a:pt x="120000" y="0"/>
-                </a:lnTo>
-                <a:lnTo>
-                  <a:pt x="120000" y="120000"/>
-                </a:lnTo>
-                <a:lnTo>
-                  <a:pt x="0" y="120000"/>
-                </a:lnTo>
-                <a:close/>
-              </a:path>
-            </a:pathLst>
-          </a:custGeom>
-          <a:noFill/>
-          <a:ln w="12700" cap="flat" cmpd="sng">
-            <a:solidFill>
-              <a:srgbClr val="000000"/>
-            </a:solidFill>
-            <a:prstDash val="solid"/>
-            <a:round/>
-            <a:headEnd type="none" w="sm" len="sm"/>
-            <a:tailEnd type="none" w="sm" len="sm"/>
-          </a:ln>
-        </p:spPr>
-      </p:sp>
-      <p:sp>
-        <p:nvSpPr>
-          <p:cNvPr id="356" name="Google Shape;356;p3:notes"/>
-          <p:cNvSpPr txBox="1"/>
-          <p:nvPr>
-            <p:ph type="body" idx="1"/>
-          </p:nvPr>
-        </p:nvSpPr>
-        <p:spPr bwMode="auto">
-          <a:xfrm>
-            <a:off x="685800" y="4400550"/>
-            <a:ext cx="5486400" cy="3600450"/>
-          </a:xfrm>
-          <a:prstGeom prst="rect">
-            <a:avLst/>
-          </a:prstGeom>
-          <a:noFill/>
-          <a:ln>
-            <a:noFill/>
-          </a:ln>
-        </p:spPr>
-        <p:txBody>
-          <a:bodyPr spcFirstLastPara="1" wrap="square" lIns="91425" tIns="45700" rIns="91425" bIns="45700" anchor="t" anchorCtr="0">
-            <a:noAutofit/>
-          </a:bodyPr>
-          <a:lstStyle/>
-          <a:p>
-            <a:pPr marL="0" lvl="0" indent="0" algn="l">
-              <a:spcBef>
-                <a:spcPts val="0"/>
-              </a:spcBef>
-              <a:spcAft>
-                <a:spcPts val="0"/>
-              </a:spcAft>
-              <a:buNone/>
-              <a:defRPr/>
-            </a:pPr>
-            <a:endParaRPr/>
-          </a:p>
-        </p:txBody>
-      </p:sp>
-      <p:sp>
-        <p:nvSpPr>
-          <p:cNvPr id="357" name="Google Shape;357;p3:notes"/>
-          <p:cNvSpPr txBox="1"/>
-          <p:nvPr>
-            <p:ph type="sldNum" idx="12"/>
-          </p:nvPr>
-        </p:nvSpPr>
-        <p:spPr bwMode="auto">
-          <a:xfrm>
-            <a:off x="3884613" y="8685213"/>
-            <a:ext cx="2971800" cy="458787"/>
-          </a:xfrm>
-          <a:prstGeom prst="rect">
-            <a:avLst/>
-          </a:prstGeom>
-          <a:noFill/>
-          <a:ln>
-            <a:noFill/>
-          </a:ln>
-        </p:spPr>
-        <p:txBody>
-          <a:bodyPr spcFirstLastPara="1" wrap="square" lIns="91425" tIns="45700" rIns="91425" bIns="45700" anchor="b" anchorCtr="0">
-            <a:noAutofit/>
-          </a:bodyPr>
-          <a:lstStyle/>
-          <a:p>
-            <a:pPr marL="0" lvl="0" indent="0" algn="r">
-              <a:spcBef>
-                <a:spcPts val="0"/>
-              </a:spcBef>
-              <a:spcAft>
-                <a:spcPts val="0"/>
-              </a:spcAft>
-              <a:buNone/>
-              <a:defRPr/>
-            </a:pPr>
-            <a:fld id="{00000000-1234-1234-1234-123412341234}" type="slidenum">
-              <a:rPr lang="en-US"/>
-              <a:t>‹#›</a:t>
-            </a:fld>
-            <a:endParaRPr/>
-          </a:p>
-        </p:txBody>
-      </p:sp>
-    </p:spTree>
-  </p:cSld>
-</p:notes>
-</file>
-
-<file path=ppt/notesSlides/notesSlide4.xml><?xml version="1.0" encoding="utf-8"?>
-<p:notes xmlns:a="http://schemas.openxmlformats.org/drawingml/2006/main" xmlns:r="http://schemas.openxmlformats.org/officeDocument/2006/relationships" xmlns:p="http://schemas.openxmlformats.org/presentationml/2006/main" xmlns:m="http://schemas.openxmlformats.org/officeDocument/2006/math" xmlns:w="http://schemas.openxmlformats.org/wordprocessingml/2006/main" showMasterPhAnim="0" showMasterSp="0">
-  <p:cSld name="">
-    <p:spTree>
-      <p:nvGrpSpPr>
-        <p:cNvPr id="1" name=""/>
-        <p:cNvGrpSpPr/>
-        <p:nvPr/>
-      </p:nvGrpSpPr>
-      <p:grpSpPr bwMode="auto">
-        <a:xfrm>
-          <a:off x="0" y="0"/>
-          <a:ext cx="0" cy="0"/>
-          <a:chOff x="0" y="0"/>
-          <a:chExt cx="0" cy="0"/>
-        </a:xfrm>
-      </p:grpSpPr>
-      <p:sp>
-        <p:nvSpPr>
-          <p:cNvPr id="362" name="Google Shape;362;p4:notes"/>
-          <p:cNvSpPr/>
-          <p:nvPr>
-            <p:ph type="sldImg" idx="2"/>
-          </p:nvPr>
-        </p:nvSpPr>
-        <p:spPr bwMode="auto">
-          <a:xfrm>
-            <a:off x="685800" y="1143000"/>
-            <a:ext cx="5486400" cy="3086100"/>
-          </a:xfrm>
-          <a:custGeom>
-            <a:avLst/>
-            <a:gdLst/>
-            <a:ahLst/>
-            <a:cxnLst/>
-            <a:rect l="l" t="t" r="r" b="b"/>
-            <a:pathLst>
-              <a:path w="120000" h="120000" fill="norm" stroke="1" extrusionOk="0">
-                <a:moveTo>
-                  <a:pt x="0" y="0"/>
-                </a:moveTo>
-                <a:lnTo>
-                  <a:pt x="120000" y="0"/>
-                </a:lnTo>
-                <a:lnTo>
-                  <a:pt x="120000" y="120000"/>
-                </a:lnTo>
-                <a:lnTo>
-                  <a:pt x="0" y="120000"/>
-                </a:lnTo>
-                <a:close/>
-              </a:path>
-            </a:pathLst>
-          </a:custGeom>
-          <a:noFill/>
-          <a:ln w="12700" cap="flat" cmpd="sng">
-            <a:solidFill>
-              <a:srgbClr val="000000"/>
-            </a:solidFill>
-            <a:prstDash val="solid"/>
-            <a:round/>
-            <a:headEnd type="none" w="sm" len="sm"/>
-            <a:tailEnd type="none" w="sm" len="sm"/>
-          </a:ln>
-        </p:spPr>
-      </p:sp>
-      <p:sp>
-        <p:nvSpPr>
-          <p:cNvPr id="363" name="Google Shape;363;p4:notes"/>
-          <p:cNvSpPr txBox="1"/>
-          <p:nvPr>
-            <p:ph type="body" idx="1"/>
-          </p:nvPr>
-        </p:nvSpPr>
-        <p:spPr bwMode="auto">
-          <a:xfrm>
-            <a:off x="685800" y="4400550"/>
-            <a:ext cx="5486400" cy="3600450"/>
-          </a:xfrm>
-          <a:prstGeom prst="rect">
-            <a:avLst/>
-          </a:prstGeom>
-          <a:noFill/>
-          <a:ln>
-            <a:noFill/>
-          </a:ln>
-        </p:spPr>
-        <p:txBody>
-          <a:bodyPr spcFirstLastPara="1" wrap="square" lIns="91425" tIns="45700" rIns="91425" bIns="45700" anchor="t" anchorCtr="0">
-            <a:noAutofit/>
-          </a:bodyPr>
-          <a:lstStyle/>
-          <a:p>
-            <a:pPr marL="0" lvl="0" indent="0" algn="l">
-              <a:spcBef>
-                <a:spcPts val="0"/>
-              </a:spcBef>
-              <a:spcAft>
-                <a:spcPts val="0"/>
-              </a:spcAft>
-              <a:buNone/>
-              <a:defRPr/>
-            </a:pPr>
-            <a:endParaRPr/>
-          </a:p>
-        </p:txBody>
-      </p:sp>
-      <p:sp>
-        <p:nvSpPr>
-          <p:cNvPr id="364" name="Google Shape;364;p4:notes"/>
-          <p:cNvSpPr txBox="1"/>
-          <p:nvPr>
-            <p:ph type="sldNum" idx="12"/>
-          </p:nvPr>
-        </p:nvSpPr>
-        <p:spPr bwMode="auto">
-          <a:xfrm>
-            <a:off x="3884613" y="8685213"/>
-            <a:ext cx="2971800" cy="458787"/>
-          </a:xfrm>
-          <a:prstGeom prst="rect">
-            <a:avLst/>
-          </a:prstGeom>
-          <a:noFill/>
-          <a:ln>
-            <a:noFill/>
-          </a:ln>
-        </p:spPr>
-        <p:txBody>
-          <a:bodyPr spcFirstLastPara="1" wrap="square" lIns="91425" tIns="45700" rIns="91425" bIns="45700" anchor="b" anchorCtr="0">
-            <a:noAutofit/>
-          </a:bodyPr>
-          <a:lstStyle/>
-          <a:p>
-            <a:pPr marL="0" lvl="0" indent="0" algn="r">
-              <a:spcBef>
-                <a:spcPts val="0"/>
-              </a:spcBef>
-              <a:spcAft>
-                <a:spcPts val="0"/>
-              </a:spcAft>
-              <a:buNone/>
-              <a:defRPr/>
-            </a:pPr>
-            <a:fld id="{00000000-1234-1234-1234-123412341234}" type="slidenum">
-              <a:rPr lang="en-US"/>
-              <a:t>‹#›</a:t>
-            </a:fld>
-            <a:endParaRPr/>
-          </a:p>
-        </p:txBody>
-      </p:sp>
-    </p:spTree>
-  </p:cSld>
-</p:notes>
-</file>
-
-<file path=ppt/notesSlides/notesSlide5.xml><?xml version="1.0" encoding="utf-8"?>
-<p:notes xmlns:a="http://schemas.openxmlformats.org/drawingml/2006/main" xmlns:r="http://schemas.openxmlformats.org/officeDocument/2006/relationships" xmlns:p="http://schemas.openxmlformats.org/presentationml/2006/main" xmlns:m="http://schemas.openxmlformats.org/officeDocument/2006/math" xmlns:w="http://schemas.openxmlformats.org/wordprocessingml/2006/main" showMasterPhAnim="0" showMasterSp="0">
-  <p:cSld name="">
-    <p:spTree>
-      <p:nvGrpSpPr>
-        <p:cNvPr id="1" name=""/>
-        <p:cNvGrpSpPr/>
-        <p:nvPr/>
-      </p:nvGrpSpPr>
-      <p:grpSpPr bwMode="auto">
-        <a:xfrm>
-          <a:off x="0" y="0"/>
-          <a:ext cx="0" cy="0"/>
-          <a:chOff x="0" y="0"/>
-          <a:chExt cx="0" cy="0"/>
-        </a:xfrm>
-      </p:grpSpPr>
-      <p:sp>
-        <p:nvSpPr>
-          <p:cNvPr id="371" name="Google Shape;371;p5:notes"/>
-          <p:cNvSpPr/>
-          <p:nvPr>
-            <p:ph type="sldImg" idx="2"/>
-          </p:nvPr>
-        </p:nvSpPr>
-        <p:spPr bwMode="auto">
-          <a:xfrm>
-            <a:off x="685800" y="1143000"/>
-            <a:ext cx="5486400" cy="3086100"/>
-          </a:xfrm>
-          <a:custGeom>
-            <a:avLst/>
-            <a:gdLst/>
-            <a:ahLst/>
-            <a:cxnLst/>
-            <a:rect l="l" t="t" r="r" b="b"/>
-            <a:pathLst>
-              <a:path w="120000" h="120000" fill="norm" stroke="1" extrusionOk="0">
-                <a:moveTo>
-                  <a:pt x="0" y="0"/>
-                </a:moveTo>
-                <a:lnTo>
-                  <a:pt x="120000" y="0"/>
-                </a:lnTo>
-                <a:lnTo>
-                  <a:pt x="120000" y="120000"/>
-                </a:lnTo>
-                <a:lnTo>
-                  <a:pt x="0" y="120000"/>
-                </a:lnTo>
-                <a:close/>
-              </a:path>
-            </a:pathLst>
-          </a:custGeom>
-          <a:noFill/>
-          <a:ln w="12700" cap="flat" cmpd="sng">
-            <a:solidFill>
-              <a:srgbClr val="000000"/>
-            </a:solidFill>
-            <a:prstDash val="solid"/>
-            <a:round/>
-            <a:headEnd type="none" w="sm" len="sm"/>
-            <a:tailEnd type="none" w="sm" len="sm"/>
-          </a:ln>
-        </p:spPr>
-      </p:sp>
-      <p:sp>
-        <p:nvSpPr>
-          <p:cNvPr id="372" name="Google Shape;372;p5:notes"/>
-          <p:cNvSpPr txBox="1"/>
-          <p:nvPr>
-            <p:ph type="body" idx="1"/>
-          </p:nvPr>
-        </p:nvSpPr>
-        <p:spPr bwMode="auto">
-          <a:xfrm>
-            <a:off x="685800" y="4400550"/>
-            <a:ext cx="5486400" cy="3600450"/>
-          </a:xfrm>
-          <a:prstGeom prst="rect">
-            <a:avLst/>
-          </a:prstGeom>
-          <a:noFill/>
-          <a:ln>
-            <a:noFill/>
-          </a:ln>
-        </p:spPr>
-        <p:txBody>
-          <a:bodyPr spcFirstLastPara="1" wrap="square" lIns="91425" tIns="45700" rIns="91425" bIns="45700" anchor="t" anchorCtr="0">
-            <a:noAutofit/>
-          </a:bodyPr>
-          <a:lstStyle/>
-          <a:p>
-            <a:pPr marL="0" lvl="0" indent="0" algn="l">
-              <a:spcBef>
-                <a:spcPts val="0"/>
-              </a:spcBef>
-              <a:spcAft>
-                <a:spcPts val="0"/>
-              </a:spcAft>
-              <a:buNone/>
-              <a:defRPr/>
-            </a:pPr>
-            <a:endParaRPr/>
-          </a:p>
-        </p:txBody>
-      </p:sp>
-      <p:sp>
-        <p:nvSpPr>
-          <p:cNvPr id="373" name="Google Shape;373;p5:notes"/>
-          <p:cNvSpPr txBox="1"/>
-          <p:nvPr>
-            <p:ph type="sldNum" idx="12"/>
-          </p:nvPr>
-        </p:nvSpPr>
-        <p:spPr bwMode="auto">
-          <a:xfrm>
-            <a:off x="3884613" y="8685213"/>
-            <a:ext cx="2971800" cy="458787"/>
-          </a:xfrm>
-          <a:prstGeom prst="rect">
-            <a:avLst/>
-          </a:prstGeom>
-          <a:noFill/>
-          <a:ln>
-            <a:noFill/>
-          </a:ln>
-        </p:spPr>
-        <p:txBody>
-          <a:bodyPr spcFirstLastPara="1" wrap="square" lIns="91425" tIns="45700" rIns="91425" bIns="45700" anchor="b" anchorCtr="0">
-            <a:noAutofit/>
-          </a:bodyPr>
-          <a:lstStyle/>
-          <a:p>
-            <a:pPr marL="0" lvl="0" indent="0" algn="r">
-              <a:spcBef>
-                <a:spcPts val="0"/>
-              </a:spcBef>
-              <a:spcAft>
-                <a:spcPts val="0"/>
-              </a:spcAft>
-              <a:buNone/>
-              <a:defRPr/>
-            </a:pPr>
-            <a:fld id="{00000000-1234-1234-1234-123412341234}" type="slidenum">
-              <a:rPr lang="en-US"/>
-              <a:t>‹#›</a:t>
-            </a:fld>
-            <a:endParaRPr/>
-          </a:p>
-        </p:txBody>
-      </p:sp>
-    </p:spTree>
-  </p:cSld>
-</p:notes>
-</file>
-
-<file path=ppt/notesSlides/notesSlide6.xml><?xml version="1.0" encoding="utf-8"?>
-<p:notes xmlns:a="http://schemas.openxmlformats.org/drawingml/2006/main" xmlns:r="http://schemas.openxmlformats.org/officeDocument/2006/relationships" xmlns:p="http://schemas.openxmlformats.org/presentationml/2006/main" xmlns:m="http://schemas.openxmlformats.org/officeDocument/2006/math" xmlns:w="http://schemas.openxmlformats.org/wordprocessingml/2006/main" showMasterPhAnim="0" showMasterSp="0">
-  <p:cSld name="">
-    <p:spTree>
-      <p:nvGrpSpPr>
-        <p:cNvPr id="1" name=""/>
-        <p:cNvGrpSpPr/>
-        <p:nvPr/>
-      </p:nvGrpSpPr>
-      <p:grpSpPr bwMode="auto">
-        <a:xfrm>
-          <a:off x="0" y="0"/>
-          <a:ext cx="0" cy="0"/>
-          <a:chOff x="0" y="0"/>
-          <a:chExt cx="0" cy="0"/>
-        </a:xfrm>
-      </p:grpSpPr>
-      <p:sp>
-        <p:nvSpPr>
-          <p:cNvPr id="380" name="Google Shape;380;p6:notes"/>
-          <p:cNvSpPr/>
-          <p:nvPr>
-            <p:ph type="sldImg" idx="2"/>
-          </p:nvPr>
-        </p:nvSpPr>
-        <p:spPr bwMode="auto">
-          <a:xfrm>
-            <a:off x="685800" y="1143000"/>
-            <a:ext cx="5486400" cy="3086100"/>
-          </a:xfrm>
-          <a:custGeom>
-            <a:avLst/>
-            <a:gdLst/>
-            <a:ahLst/>
-            <a:cxnLst/>
-            <a:rect l="l" t="t" r="r" b="b"/>
-            <a:pathLst>
-              <a:path w="120000" h="120000" fill="norm" stroke="1" extrusionOk="0">
-                <a:moveTo>
-                  <a:pt x="0" y="0"/>
-                </a:moveTo>
-                <a:lnTo>
-                  <a:pt x="120000" y="0"/>
-                </a:lnTo>
-                <a:lnTo>
-                  <a:pt x="120000" y="120000"/>
-                </a:lnTo>
-                <a:lnTo>
-                  <a:pt x="0" y="120000"/>
-                </a:lnTo>
-                <a:close/>
-              </a:path>
-            </a:pathLst>
-          </a:custGeom>
-          <a:noFill/>
-          <a:ln w="12700" cap="flat" cmpd="sng">
-            <a:solidFill>
-              <a:srgbClr val="000000"/>
-            </a:solidFill>
-            <a:prstDash val="solid"/>
-            <a:round/>
-            <a:headEnd type="none" w="sm" len="sm"/>
-            <a:tailEnd type="none" w="sm" len="sm"/>
-          </a:ln>
-        </p:spPr>
-      </p:sp>
-      <p:sp>
-        <p:nvSpPr>
-          <p:cNvPr id="381" name="Google Shape;381;p6:notes"/>
-          <p:cNvSpPr txBox="1"/>
-          <p:nvPr>
-            <p:ph type="body" idx="1"/>
-          </p:nvPr>
-        </p:nvSpPr>
-        <p:spPr bwMode="auto">
-          <a:xfrm>
-            <a:off x="685800" y="4400550"/>
-            <a:ext cx="5486400" cy="3600450"/>
-          </a:xfrm>
-          <a:prstGeom prst="rect">
-            <a:avLst/>
-          </a:prstGeom>
-          <a:noFill/>
-          <a:ln>
-            <a:noFill/>
-          </a:ln>
-        </p:spPr>
-        <p:txBody>
-          <a:bodyPr spcFirstLastPara="1" wrap="square" lIns="91425" tIns="45700" rIns="91425" bIns="45700" anchor="t" anchorCtr="0">
-            <a:noAutofit/>
-          </a:bodyPr>
-          <a:lstStyle/>
-          <a:p>
-            <a:pPr marL="0" lvl="0" indent="0" algn="l">
-              <a:spcBef>
-                <a:spcPts val="0"/>
-              </a:spcBef>
-              <a:spcAft>
-                <a:spcPts val="0"/>
-              </a:spcAft>
-              <a:buNone/>
-              <a:defRPr/>
-            </a:pPr>
-            <a:endParaRPr/>
-          </a:p>
-        </p:txBody>
-      </p:sp>
-      <p:sp>
-        <p:nvSpPr>
-          <p:cNvPr id="382" name="Google Shape;382;p6:notes"/>
-          <p:cNvSpPr txBox="1"/>
-          <p:nvPr>
-            <p:ph type="sldNum" idx="12"/>
-          </p:nvPr>
-        </p:nvSpPr>
-        <p:spPr bwMode="auto">
-          <a:xfrm>
-            <a:off x="3884613" y="8685213"/>
-            <a:ext cx="2971800" cy="458787"/>
-          </a:xfrm>
-          <a:prstGeom prst="rect">
-            <a:avLst/>
-          </a:prstGeom>
-          <a:noFill/>
-          <a:ln>
-            <a:noFill/>
-          </a:ln>
-        </p:spPr>
-        <p:txBody>
-          <a:bodyPr spcFirstLastPara="1" wrap="square" lIns="91425" tIns="45700" rIns="91425" bIns="45700" anchor="b" anchorCtr="0">
-            <a:noAutofit/>
-          </a:bodyPr>
-          <a:lstStyle/>
-          <a:p>
-            <a:pPr marL="0" lvl="0" indent="0" algn="r">
-              <a:spcBef>
-                <a:spcPts val="0"/>
-              </a:spcBef>
-              <a:spcAft>
-                <a:spcPts val="0"/>
-              </a:spcAft>
-              <a:buNone/>
-              <a:defRPr/>
-            </a:pPr>
-            <a:fld id="{00000000-1234-1234-1234-123412341234}" type="slidenum">
-              <a:rPr lang="en-US"/>
-              <a:t>‹#›</a:t>
-            </a:fld>
-            <a:endParaRPr/>
-          </a:p>
-        </p:txBody>
-      </p:sp>
-    </p:spTree>
-  </p:cSld>
-</p:notes>
-</file>
-
-<file path=ppt/notesSlides/notesSlide7.xml><?xml version="1.0" encoding="utf-8"?>
-<p:notes xmlns:a="http://schemas.openxmlformats.org/drawingml/2006/main" xmlns:r="http://schemas.openxmlformats.org/officeDocument/2006/relationships" xmlns:p="http://schemas.openxmlformats.org/presentationml/2006/main" xmlns:m="http://schemas.openxmlformats.org/officeDocument/2006/math" xmlns:w="http://schemas.openxmlformats.org/wordprocessingml/2006/main" showMasterPhAnim="0" showMasterSp="0">
-  <p:cSld name="">
-    <p:spTree>
-      <p:nvGrpSpPr>
-        <p:cNvPr id="1" name=""/>
-        <p:cNvGrpSpPr/>
-        <p:nvPr/>
-      </p:nvGrpSpPr>
-      <p:grpSpPr bwMode="auto">
-        <a:xfrm>
-          <a:off x="0" y="0"/>
-          <a:ext cx="0" cy="0"/>
-          <a:chOff x="0" y="0"/>
-          <a:chExt cx="0" cy="0"/>
-        </a:xfrm>
-      </p:grpSpPr>
-      <p:sp>
-        <p:nvSpPr>
-          <p:cNvPr id="389" name="Google Shape;389;p7:notes"/>
-          <p:cNvSpPr/>
-          <p:nvPr>
-            <p:ph type="sldImg" idx="2"/>
-          </p:nvPr>
-        </p:nvSpPr>
-        <p:spPr bwMode="auto">
-          <a:xfrm>
-            <a:off x="685800" y="1143000"/>
-            <a:ext cx="5486400" cy="3086100"/>
-          </a:xfrm>
-          <a:custGeom>
-            <a:avLst/>
-            <a:gdLst/>
-            <a:ahLst/>
-            <a:cxnLst/>
-            <a:rect l="l" t="t" r="r" b="b"/>
-            <a:pathLst>
-              <a:path w="120000" h="120000" fill="norm" stroke="1" extrusionOk="0">
-                <a:moveTo>
-                  <a:pt x="0" y="0"/>
-                </a:moveTo>
-                <a:lnTo>
-                  <a:pt x="120000" y="0"/>
-                </a:lnTo>
-                <a:lnTo>
-                  <a:pt x="120000" y="120000"/>
-                </a:lnTo>
-                <a:lnTo>
-                  <a:pt x="0" y="120000"/>
-                </a:lnTo>
-                <a:close/>
-              </a:path>
-            </a:pathLst>
-          </a:custGeom>
-          <a:noFill/>
-          <a:ln w="12700" cap="flat" cmpd="sng">
-            <a:solidFill>
-              <a:srgbClr val="000000"/>
-            </a:solidFill>
-            <a:prstDash val="solid"/>
-            <a:round/>
-            <a:headEnd type="none" w="sm" len="sm"/>
-            <a:tailEnd type="none" w="sm" len="sm"/>
-          </a:ln>
-        </p:spPr>
-      </p:sp>
-      <p:sp>
-        <p:nvSpPr>
-          <p:cNvPr id="390" name="Google Shape;390;p7:notes"/>
-          <p:cNvSpPr txBox="1"/>
-          <p:nvPr>
-            <p:ph type="body" idx="1"/>
-          </p:nvPr>
-        </p:nvSpPr>
-        <p:spPr bwMode="auto">
-          <a:xfrm>
-            <a:off x="685800" y="4400550"/>
-            <a:ext cx="5486400" cy="3600450"/>
-          </a:xfrm>
-          <a:prstGeom prst="rect">
-            <a:avLst/>
-          </a:prstGeom>
-          <a:noFill/>
-          <a:ln>
-            <a:noFill/>
-          </a:ln>
-        </p:spPr>
-        <p:txBody>
-          <a:bodyPr spcFirstLastPara="1" wrap="square" lIns="91425" tIns="45700" rIns="91425" bIns="45700" anchor="t" anchorCtr="0">
-            <a:noAutofit/>
-          </a:bodyPr>
-          <a:lstStyle/>
-          <a:p>
-            <a:pPr marL="0" lvl="0" indent="0" algn="l">
-              <a:spcBef>
-                <a:spcPts val="0"/>
-              </a:spcBef>
-              <a:spcAft>
-                <a:spcPts val="0"/>
-              </a:spcAft>
-              <a:buNone/>
-              <a:defRPr/>
-            </a:pPr>
-            <a:endParaRPr/>
-          </a:p>
-        </p:txBody>
-      </p:sp>
-      <p:sp>
-        <p:nvSpPr>
-          <p:cNvPr id="391" name="Google Shape;391;p7:notes"/>
-          <p:cNvSpPr txBox="1"/>
-          <p:nvPr>
-            <p:ph type="sldNum" idx="12"/>
-          </p:nvPr>
-        </p:nvSpPr>
-        <p:spPr bwMode="auto">
-          <a:xfrm>
-            <a:off x="3884613" y="8685213"/>
-            <a:ext cx="2971800" cy="458787"/>
-          </a:xfrm>
-          <a:prstGeom prst="rect">
-            <a:avLst/>
-          </a:prstGeom>
-          <a:noFill/>
-          <a:ln>
-            <a:noFill/>
-          </a:ln>
-        </p:spPr>
-        <p:txBody>
-          <a:bodyPr spcFirstLastPara="1" wrap="square" lIns="91425" tIns="45700" rIns="91425" bIns="45700" anchor="b" anchorCtr="0">
-            <a:noAutofit/>
-          </a:bodyPr>
-          <a:lstStyle/>
-          <a:p>
-            <a:pPr marL="0" lvl="0" indent="0" algn="r">
-              <a:spcBef>
-                <a:spcPts val="0"/>
-              </a:spcBef>
-              <a:spcAft>
-                <a:spcPts val="0"/>
-              </a:spcAft>
-              <a:buNone/>
-              <a:defRPr/>
-            </a:pPr>
-            <a:fld id="{00000000-1234-1234-1234-123412341234}" type="slidenum">
-              <a:rPr lang="en-US"/>
-              <a:t>‹#›</a:t>
-            </a:fld>
-            <a:endParaRPr/>
-          </a:p>
-        </p:txBody>
-      </p:sp>
-    </p:spTree>
-  </p:cSld>
-</p:notes>
-</file>
-
-<file path=ppt/notesSlides/notesSlide8.xml><?xml version="1.0" encoding="utf-8"?>
-<p:notes xmlns:a="http://schemas.openxmlformats.org/drawingml/2006/main" xmlns:r="http://schemas.openxmlformats.org/officeDocument/2006/relationships" xmlns:p="http://schemas.openxmlformats.org/presentationml/2006/main" xmlns:m="http://schemas.openxmlformats.org/officeDocument/2006/math" xmlns:w="http://schemas.openxmlformats.org/wordprocessingml/2006/main" showMasterPhAnim="0" showMasterSp="0">
-  <p:cSld name="">
-    <p:spTree>
-      <p:nvGrpSpPr>
-        <p:cNvPr id="1" name=""/>
-        <p:cNvGrpSpPr/>
-        <p:nvPr/>
-      </p:nvGrpSpPr>
-      <p:grpSpPr bwMode="auto">
-        <a:xfrm>
-          <a:off x="0" y="0"/>
-          <a:ext cx="0" cy="0"/>
-          <a:chOff x="0" y="0"/>
-          <a:chExt cx="0" cy="0"/>
-        </a:xfrm>
-      </p:grpSpPr>
-      <p:sp>
-        <p:nvSpPr>
-          <p:cNvPr id="396" name="Google Shape;396;p8:notes"/>
-          <p:cNvSpPr/>
-          <p:nvPr>
-            <p:ph type="sldImg" idx="2"/>
-          </p:nvPr>
-        </p:nvSpPr>
-        <p:spPr bwMode="auto">
-          <a:xfrm>
-            <a:off x="685800" y="1143000"/>
-            <a:ext cx="5486400" cy="3086100"/>
-          </a:xfrm>
-          <a:custGeom>
-            <a:avLst/>
-            <a:gdLst/>
-            <a:ahLst/>
-            <a:cxnLst/>
-            <a:rect l="l" t="t" r="r" b="b"/>
-            <a:pathLst>
-              <a:path w="120000" h="120000" fill="norm" stroke="1" extrusionOk="0">
-                <a:moveTo>
-                  <a:pt x="0" y="0"/>
-                </a:moveTo>
-                <a:lnTo>
-                  <a:pt x="120000" y="0"/>
-                </a:lnTo>
-                <a:lnTo>
-                  <a:pt x="120000" y="120000"/>
-                </a:lnTo>
-                <a:lnTo>
-                  <a:pt x="0" y="120000"/>
-                </a:lnTo>
-                <a:close/>
-              </a:path>
-            </a:pathLst>
-          </a:custGeom>
-          <a:noFill/>
-          <a:ln w="12700" cap="flat" cmpd="sng">
-            <a:solidFill>
-              <a:srgbClr val="000000"/>
-            </a:solidFill>
-            <a:prstDash val="solid"/>
-            <a:round/>
-            <a:headEnd type="none" w="sm" len="sm"/>
-            <a:tailEnd type="none" w="sm" len="sm"/>
-          </a:ln>
-        </p:spPr>
-      </p:sp>
-      <p:sp>
-        <p:nvSpPr>
-          <p:cNvPr id="397" name="Google Shape;397;p8:notes"/>
-          <p:cNvSpPr txBox="1"/>
-          <p:nvPr>
-            <p:ph type="body" idx="1"/>
-          </p:nvPr>
-        </p:nvSpPr>
-        <p:spPr bwMode="auto">
-          <a:xfrm>
-            <a:off x="685800" y="4400550"/>
-            <a:ext cx="5486400" cy="3600450"/>
-          </a:xfrm>
-          <a:prstGeom prst="rect">
-            <a:avLst/>
-          </a:prstGeom>
-          <a:noFill/>
-          <a:ln>
-            <a:noFill/>
-          </a:ln>
-        </p:spPr>
-        <p:txBody>
-          <a:bodyPr spcFirstLastPara="1" wrap="square" lIns="91425" tIns="45700" rIns="91425" bIns="45700" anchor="t" anchorCtr="0">
-            <a:noAutofit/>
-          </a:bodyPr>
-          <a:lstStyle/>
-          <a:p>
-            <a:pPr marL="0" lvl="0" indent="0" algn="l">
-              <a:spcBef>
-                <a:spcPts val="0"/>
-              </a:spcBef>
-              <a:spcAft>
-                <a:spcPts val="0"/>
-              </a:spcAft>
-              <a:buNone/>
-              <a:defRPr/>
-            </a:pPr>
-            <a:endParaRPr/>
-          </a:p>
-        </p:txBody>
-      </p:sp>
-      <p:sp>
-        <p:nvSpPr>
-          <p:cNvPr id="398" name="Google Shape;398;p8:notes"/>
-          <p:cNvSpPr txBox="1"/>
-          <p:nvPr>
-            <p:ph type="sldNum" idx="12"/>
-          </p:nvPr>
-        </p:nvSpPr>
-        <p:spPr bwMode="auto">
-          <a:xfrm>
-            <a:off x="3884613" y="8685213"/>
-            <a:ext cx="2971800" cy="458787"/>
-          </a:xfrm>
-          <a:prstGeom prst="rect">
-            <a:avLst/>
-          </a:prstGeom>
-          <a:noFill/>
-          <a:ln>
-            <a:noFill/>
-          </a:ln>
-        </p:spPr>
-        <p:txBody>
-          <a:bodyPr spcFirstLastPara="1" wrap="square" lIns="91425" tIns="45700" rIns="91425" bIns="45700" anchor="b" anchorCtr="0">
-            <a:noAutofit/>
-          </a:bodyPr>
-          <a:lstStyle/>
-          <a:p>
-            <a:pPr marL="0" lvl="0" indent="0" algn="r">
-              <a:spcBef>
-                <a:spcPts val="0"/>
-              </a:spcBef>
-              <a:spcAft>
-                <a:spcPts val="0"/>
-              </a:spcAft>
-              <a:buNone/>
-              <a:defRPr/>
-            </a:pPr>
-            <a:fld id="{00000000-1234-1234-1234-123412341234}" type="slidenum">
-              <a:rPr lang="en-US"/>
-              <a:t>‹#›</a:t>
-            </a:fld>
-            <a:endParaRPr/>
-          </a:p>
-        </p:txBody>
-      </p:sp>
-    </p:spTree>
-  </p:cSld>
-</p:notes>
-</file>
-
-<file path=ppt/notesSlides/notesSlide9.xml><?xml version="1.0" encoding="utf-8"?>
-<p:notes xmlns:a="http://schemas.openxmlformats.org/drawingml/2006/main" xmlns:r="http://schemas.openxmlformats.org/officeDocument/2006/relationships" xmlns:p="http://schemas.openxmlformats.org/presentationml/2006/main" xmlns:m="http://schemas.openxmlformats.org/officeDocument/2006/math" xmlns:w="http://schemas.openxmlformats.org/wordprocessingml/2006/main" showMasterPhAnim="0" showMasterSp="0">
-  <p:cSld name="">
-    <p:spTree>
-      <p:nvGrpSpPr>
-        <p:cNvPr id="1" name=""/>
-        <p:cNvGrpSpPr/>
-        <p:nvPr/>
-      </p:nvGrpSpPr>
-      <p:grpSpPr bwMode="auto">
-        <a:xfrm>
-          <a:off x="0" y="0"/>
-          <a:ext cx="0" cy="0"/>
-          <a:chOff x="0" y="0"/>
-          <a:chExt cx="0" cy="0"/>
-        </a:xfrm>
-      </p:grpSpPr>
-      <p:sp>
-        <p:nvSpPr>
-          <p:cNvPr id="405" name="Google Shape;405;p9:notes"/>
-          <p:cNvSpPr/>
-          <p:nvPr>
-            <p:ph type="sldImg" idx="2"/>
-          </p:nvPr>
-        </p:nvSpPr>
-        <p:spPr bwMode="auto">
-          <a:xfrm>
-            <a:off x="685800" y="1143000"/>
-            <a:ext cx="5486400" cy="3086100"/>
-          </a:xfrm>
-          <a:custGeom>
-            <a:avLst/>
-            <a:gdLst/>
-            <a:ahLst/>
-            <a:cxnLst/>
-            <a:rect l="l" t="t" r="r" b="b"/>
-            <a:pathLst>
-              <a:path w="120000" h="120000" fill="norm" stroke="1" extrusionOk="0">
-                <a:moveTo>
-                  <a:pt x="0" y="0"/>
-                </a:moveTo>
-                <a:lnTo>
-                  <a:pt x="120000" y="0"/>
-                </a:lnTo>
-                <a:lnTo>
-                  <a:pt x="120000" y="120000"/>
-                </a:lnTo>
-                <a:lnTo>
-                  <a:pt x="0" y="120000"/>
-                </a:lnTo>
-                <a:close/>
-              </a:path>
-            </a:pathLst>
-          </a:custGeom>
-          <a:noFill/>
-          <a:ln w="12700" cap="flat" cmpd="sng">
-            <a:solidFill>
-              <a:srgbClr val="000000"/>
-            </a:solidFill>
-            <a:prstDash val="solid"/>
-            <a:round/>
-            <a:headEnd type="none" w="sm" len="sm"/>
-            <a:tailEnd type="none" w="sm" len="sm"/>
-          </a:ln>
-        </p:spPr>
-      </p:sp>
-      <p:sp>
-        <p:nvSpPr>
-          <p:cNvPr id="406" name="Google Shape;406;p9:notes"/>
-          <p:cNvSpPr txBox="1"/>
-          <p:nvPr>
-            <p:ph type="body" idx="1"/>
-          </p:nvPr>
-        </p:nvSpPr>
-        <p:spPr bwMode="auto">
-          <a:xfrm>
-            <a:off x="685800" y="4400550"/>
-            <a:ext cx="5486400" cy="3600450"/>
-          </a:xfrm>
-          <a:prstGeom prst="rect">
-            <a:avLst/>
-          </a:prstGeom>
-          <a:noFill/>
-          <a:ln>
-            <a:noFill/>
-          </a:ln>
-        </p:spPr>
-        <p:txBody>
-          <a:bodyPr spcFirstLastPara="1" wrap="square" lIns="91425" tIns="45700" rIns="91425" bIns="45700" anchor="t" anchorCtr="0">
-            <a:noAutofit/>
-          </a:bodyPr>
-          <a:lstStyle/>
-          <a:p>
-            <a:pPr marL="0" lvl="0" indent="0" algn="l">
-              <a:spcBef>
-                <a:spcPts val="0"/>
-              </a:spcBef>
-              <a:spcAft>
-                <a:spcPts val="0"/>
-              </a:spcAft>
-              <a:buNone/>
-              <a:defRPr/>
-            </a:pPr>
-            <a:endParaRPr/>
-          </a:p>
-        </p:txBody>
-      </p:sp>
-      <p:sp>
-        <p:nvSpPr>
-          <p:cNvPr id="407" name="Google Shape;407;p9:notes"/>
-          <p:cNvSpPr txBox="1"/>
-          <p:nvPr>
-            <p:ph type="sldNum" idx="12"/>
-          </p:nvPr>
-        </p:nvSpPr>
-        <p:spPr bwMode="auto">
-          <a:xfrm>
-            <a:off x="3884613" y="8685213"/>
-            <a:ext cx="2971800" cy="458787"/>
-          </a:xfrm>
-          <a:prstGeom prst="rect">
-            <a:avLst/>
-          </a:prstGeom>
-          <a:noFill/>
-          <a:ln>
-            <a:noFill/>
-          </a:ln>
-        </p:spPr>
-        <p:txBody>
-          <a:bodyPr spcFirstLastPara="1" wrap="square" lIns="91425" tIns="45700" rIns="91425" bIns="45700" anchor="b" anchorCtr="0">
-            <a:noAutofit/>
-          </a:bodyPr>
-          <a:lstStyle/>
-          <a:p>
-            <a:pPr marL="0" lvl="0" indent="0" algn="r">
-              <a:spcBef>
-                <a:spcPts val="0"/>
-              </a:spcBef>
-              <a:spcAft>
-                <a:spcPts val="0"/>
-              </a:spcAft>
-              <a:buNone/>
-              <a:defRPr/>
-            </a:pPr>
-            <a:fld id="{00000000-1234-1234-1234-123412341234}" type="slidenum">
-              <a:rPr lang="en-US"/>
-              <a:t>‹#›</a:t>
-            </a:fld>
-            <a:endParaRPr/>
-          </a:p>
-        </p:txBody>
-      </p:sp>
-    </p:spTree>
-  </p:cSld>
-</p:notes>
-</file>
-
 <file path=ppt/slideLayouts/slideLayout1.xml><?xml version="1.0" encoding="utf-8"?>
 <p:sldLayout xmlns:a="http://schemas.openxmlformats.org/drawingml/2006/main" xmlns:r="http://schemas.openxmlformats.org/officeDocument/2006/relationships" xmlns:p="http://schemas.openxmlformats.org/presentationml/2006/main" xmlns:m="http://schemas.openxmlformats.org/officeDocument/2006/math" xmlns:w="http://schemas.openxmlformats.org/wordprocessingml/2006/main" matchingName="Title Slide" preserve="0" showMasterPhAnim="0" showMasterSp="0" type="title" userDrawn="1">
   <p:cSld name="TITLE">
@@ -4088,7 +971,7 @@
             </a:pPr>
             <a:fld id="{00000000-1234-1234-1234-123412341234}" type="slidenum">
               <a:rPr lang="en-US"/>
-              <a:t>‹#›</a:t>
+              <a:t/>
             </a:fld>
             <a:endParaRPr/>
           </a:p>
@@ -4735,7 +1618,7 @@
                 </a:prstGeom>
                 <a:solidFill>
                   <a:srgbClr val="92CCDC">
-                    <a:alpha val="29802"/>
+                    <a:alpha val="29801"/>
                   </a:srgbClr>
                 </a:solidFill>
                 <a:ln>
@@ -5277,7 +2160,7 @@
                 </a:prstGeom>
                 <a:solidFill>
                   <a:srgbClr val="FE75FF">
-                    <a:alpha val="29802"/>
+                    <a:alpha val="29801"/>
                   </a:srgbClr>
                 </a:solidFill>
                 <a:ln>
@@ -5363,7 +2246,7 @@
                 </a:prstGeom>
                 <a:solidFill>
                   <a:srgbClr val="BFBF00">
-                    <a:alpha val="29802"/>
+                    <a:alpha val="29801"/>
                   </a:srgbClr>
                 </a:solidFill>
                 <a:ln>
@@ -6849,7 +3732,7 @@
             </a:prstGeom>
             <a:solidFill>
               <a:srgbClr val="FE75FF">
-                <a:alpha val="29802"/>
+                <a:alpha val="29801"/>
               </a:srgbClr>
             </a:solidFill>
             <a:ln>
@@ -8087,7 +4970,7 @@
             </a:pPr>
             <a:fld id="{00000000-1234-1234-1234-123412341234}" type="slidenum">
               <a:rPr lang="en-US"/>
-              <a:t>‹#›</a:t>
+              <a:t/>
             </a:fld>
             <a:endParaRPr/>
           </a:p>
@@ -8794,7 +5677,7 @@
             </a:pPr>
             <a:fld id="{00000000-1234-1234-1234-123412341234}" type="slidenum">
               <a:rPr lang="en-US"/>
-              <a:t>‹#›</a:t>
+              <a:t/>
             </a:fld>
             <a:endParaRPr/>
           </a:p>
@@ -9500,7 +6383,7 @@
             </a:pPr>
             <a:fld id="{00000000-1234-1234-1234-123412341234}" type="slidenum">
               <a:rPr lang="en-US"/>
-              <a:t>‹#›</a:t>
+              <a:t/>
             </a:fld>
             <a:endParaRPr/>
           </a:p>
@@ -10239,7 +7122,7 @@
             </a:pPr>
             <a:fld id="{00000000-1234-1234-1234-123412341234}" type="slidenum">
               <a:rPr lang="en-US"/>
-              <a:t>‹#›</a:t>
+              <a:t/>
             </a:fld>
             <a:endParaRPr/>
           </a:p>
@@ -10965,7 +7848,7 @@
             </a:pPr>
             <a:fld id="{00000000-1234-1234-1234-123412341234}" type="slidenum">
               <a:rPr lang="en-US"/>
-              <a:t>‹#›</a:t>
+              <a:t/>
             </a:fld>
             <a:endParaRPr/>
           </a:p>
@@ -12154,7 +9037,7 @@
             </a:pPr>
             <a:fld id="{00000000-1234-1234-1234-123412341234}" type="slidenum">
               <a:rPr lang="en-US"/>
-              <a:t>‹#›</a:t>
+              <a:t/>
             </a:fld>
             <a:endParaRPr/>
           </a:p>
@@ -12840,7 +9723,7 @@
             </a:pPr>
             <a:fld id="{00000000-1234-1234-1234-123412341234}" type="slidenum">
               <a:rPr lang="en-US"/>
-              <a:t>‹#›</a:t>
+              <a:t/>
             </a:fld>
             <a:endParaRPr/>
           </a:p>
@@ -13244,7 +10127,7 @@
             </a:pPr>
             <a:fld id="{00000000-1234-1234-1234-123412341234}" type="slidenum">
               <a:rPr lang="en-US"/>
-              <a:t>‹#›</a:t>
+              <a:t/>
             </a:fld>
             <a:endParaRPr/>
           </a:p>
@@ -13974,7 +10857,7 @@
             </a:pPr>
             <a:fld id="{00000000-1234-1234-1234-123412341234}" type="slidenum">
               <a:rPr lang="en-US"/>
-              <a:t>‹#›</a:t>
+              <a:t/>
             </a:fld>
             <a:endParaRPr/>
           </a:p>
@@ -14844,7 +11727,7 @@
             </a:pPr>
             <a:fld id="{00000000-1234-1234-1234-123412341234}" type="slidenum">
               <a:rPr lang="en-US"/>
-              <a:t>‹#›</a:t>
+              <a:t/>
             </a:fld>
             <a:endParaRPr/>
           </a:p>
@@ -15605,7 +12488,7 @@
                 </a:prstGeom>
                 <a:solidFill>
                   <a:srgbClr val="92CCDC">
-                    <a:alpha val="29802"/>
+                    <a:alpha val="29801"/>
                   </a:srgbClr>
                 </a:solidFill>
                 <a:ln>
@@ -16147,7 +13030,7 @@
                 </a:prstGeom>
                 <a:solidFill>
                   <a:srgbClr val="FE75FF">
-                    <a:alpha val="29802"/>
+                    <a:alpha val="29801"/>
                   </a:srgbClr>
                 </a:solidFill>
                 <a:ln>
@@ -16233,7 +13116,7 @@
                 </a:prstGeom>
                 <a:solidFill>
                   <a:srgbClr val="BFBF00">
-                    <a:alpha val="29802"/>
+                    <a:alpha val="29801"/>
                   </a:srgbClr>
                 </a:solidFill>
                 <a:ln>
@@ -17891,7 +14774,7 @@
                 </a:prstGeom>
                 <a:solidFill>
                   <a:srgbClr val="92CCDC">
-                    <a:alpha val="29802"/>
+                    <a:alpha val="29801"/>
                   </a:srgbClr>
                 </a:solidFill>
                 <a:ln>
@@ -18433,7 +15316,7 @@
                 </a:prstGeom>
                 <a:solidFill>
                   <a:srgbClr val="FE75FF">
-                    <a:alpha val="29802"/>
+                    <a:alpha val="29801"/>
                   </a:srgbClr>
                 </a:solidFill>
                 <a:ln>
@@ -18519,7 +15402,7 @@
                 </a:prstGeom>
                 <a:solidFill>
                   <a:srgbClr val="BFBF00">
-                    <a:alpha val="29802"/>
+                    <a:alpha val="29801"/>
                   </a:srgbClr>
                 </a:solidFill>
                 <a:ln>
@@ -20208,7 +17091,7 @@
           </a:prstGeom>
           <a:solidFill>
             <a:srgbClr val="FE75FF">
-              <a:alpha val="29802"/>
+              <a:alpha val="29801"/>
             </a:srgbClr>
           </a:solidFill>
           <a:ln>
@@ -21058,7 +17941,7 @@
           </a:prstGeom>
           <a:solidFill>
             <a:srgbClr val="FE75FF">
-              <a:alpha val="29802"/>
+              <a:alpha val="29801"/>
             </a:srgbClr>
           </a:solidFill>
           <a:ln>
@@ -22145,7 +19028,7 @@
             </a:pPr>
             <a:fld id="{00000000-1234-1234-1234-123412341234}" type="slidenum">
               <a:rPr lang="en-US"/>
-              <a:t>‹#›</a:t>
+              <a:t/>
             </a:fld>
             <a:endParaRPr/>
           </a:p>
@@ -23233,7 +20116,7 @@
     <p:bg>
       <p:bgPr shadeToTitle="0">
         <a:blipFill>
-          <a:blip r:embed="rId3">
+          <a:blip r:embed="rId2">
             <a:alphaModFix amt="99999"/>
           </a:blip>
           <a:tile algn="tl" flip="none" sx="100000" sy="100000" tx="0" ty="0"/>
@@ -23393,7 +20276,7 @@
     <a:masterClrMapping/>
   </p:clrMapOvr>
   <mc:AlternateContent xmlns:mc="http://schemas.openxmlformats.org/markup-compatibility/2006">
-    <mc:Choice xmlns:p159="http://schemas.microsoft.com/office/powerpoint/2015/09/main" xmlns:p14="http://schemas.microsoft.com/office/powerpoint/2010/main" Requires="p159">
+    <mc:Choice xmlns:p14="http://schemas.microsoft.com/office/powerpoint/2010/main" Requires="p14">
       <p:transition p14:dur="2000" advClick="1"/>
     </mc:Choice>
     <mc:Fallback>
@@ -23697,7 +20580,7 @@
           <p:nvPr/>
         </p:nvPicPr>
         <p:blipFill>
-          <a:blip r:embed="rId3">
+          <a:blip r:embed="rId2">
             <a:alphaModFix/>
           </a:blip>
           <a:srcRect l="0" t="0" r="0" b="0"/>
@@ -23780,7 +20663,7 @@
     <a:masterClrMapping/>
   </p:clrMapOvr>
   <mc:AlternateContent xmlns:mc="http://schemas.openxmlformats.org/markup-compatibility/2006">
-    <mc:Choice xmlns:p159="http://schemas.microsoft.com/office/powerpoint/2015/09/main" xmlns:p14="http://schemas.microsoft.com/office/powerpoint/2010/main" Requires="p159">
+    <mc:Choice xmlns:p14="http://schemas.microsoft.com/office/powerpoint/2010/main" Requires="p14">
       <p:transition p14:dur="2000" advClick="1"/>
     </mc:Choice>
     <mc:Fallback>
@@ -23791,6 +20674,1012 @@
 </file>
 
 <file path=ppt/slides/slide11.xml><?xml version="1.0" encoding="utf-8"?>
+<p:sld xmlns:a="http://schemas.openxmlformats.org/drawingml/2006/main" xmlns:r="http://schemas.openxmlformats.org/officeDocument/2006/relationships" xmlns:p="http://schemas.openxmlformats.org/presentationml/2006/main" xmlns:m="http://schemas.openxmlformats.org/officeDocument/2006/math" xmlns:w="http://schemas.openxmlformats.org/wordprocessingml/2006/main" showMasterPhAnim="0" show="1">
+  <p:cSld name="">
+    <p:spTree>
+      <p:nvGrpSpPr>
+        <p:cNvPr id="1" name=""/>
+        <p:cNvGrpSpPr/>
+        <p:nvPr/>
+      </p:nvGrpSpPr>
+      <p:grpSpPr bwMode="auto">
+        <a:xfrm>
+          <a:off x="0" y="0"/>
+          <a:ext cx="0" cy="0"/>
+          <a:chOff x="0" y="0"/>
+          <a:chExt cx="0" cy="0"/>
+        </a:xfrm>
+      </p:grpSpPr>
+      <p:sp>
+        <p:nvSpPr>
+          <p:cNvPr id="1945863494" name="Google Shape;419;p22"/>
+          <p:cNvSpPr txBox="1"/>
+          <p:nvPr>
+            <p:ph type="title"/>
+          </p:nvPr>
+        </p:nvSpPr>
+        <p:spPr bwMode="auto">
+          <a:xfrm>
+            <a:off x="2676486" y="220638"/>
+            <a:ext cx="6750077" cy="856126"/>
+          </a:xfrm>
+          <a:prstGeom prst="rect">
+            <a:avLst/>
+          </a:prstGeom>
+          <a:solidFill>
+            <a:schemeClr val="lt1">
+              <a:alpha val="83921"/>
+            </a:schemeClr>
+          </a:solidFill>
+          <a:ln>
+            <a:noFill/>
+          </a:ln>
+        </p:spPr>
+        <p:txBody>
+          <a:bodyPr spcFirstLastPara="1" wrap="square" lIns="91424" tIns="45699" rIns="91424" bIns="45699" anchor="ctr" anchorCtr="0">
+            <a:normAutofit/>
+          </a:bodyPr>
+          <a:lstStyle/>
+          <a:p>
+            <a:pPr marL="0" lvl="0" indent="0" algn="ctr">
+              <a:spcBef>
+                <a:spcPts val="0"/>
+              </a:spcBef>
+              <a:spcAft>
+                <a:spcPts val="0"/>
+              </a:spcAft>
+              <a:buClr>
+                <a:srgbClr val="00007F"/>
+              </a:buClr>
+              <a:buSzPts val="3200"/>
+              <a:buFont typeface="Arial"/>
+              <a:buNone/>
+              <a:defRPr/>
+            </a:pPr>
+            <a:r>
+              <a:rPr lang="en-US"/>
+              <a:t>seccomp</a:t>
+            </a:r>
+            <a:endParaRPr/>
+          </a:p>
+        </p:txBody>
+      </p:sp>
+      <p:sp>
+        <p:nvSpPr>
+          <p:cNvPr id="1836896347" name="Google Shape;420;p22"/>
+          <p:cNvSpPr txBox="1"/>
+          <p:nvPr>
+            <p:ph type="body" idx="1"/>
+          </p:nvPr>
+        </p:nvSpPr>
+        <p:spPr bwMode="auto">
+          <a:xfrm>
+            <a:off x="609598" y="1340766"/>
+            <a:ext cx="10972800" cy="4608513"/>
+          </a:xfrm>
+          <a:prstGeom prst="rect">
+            <a:avLst/>
+          </a:prstGeom>
+          <a:noFill/>
+          <a:ln>
+            <a:noFill/>
+          </a:ln>
+        </p:spPr>
+        <p:txBody>
+          <a:bodyPr spcFirstLastPara="1" vertOverflow="overflow" horzOverflow="overflow" vert="horz" wrap="square" lIns="91424" tIns="45699" rIns="91424" bIns="45699" numCol="1" spcCol="0" rtlCol="0" fromWordArt="0" anchor="t" anchorCtr="0" forceAA="0" upright="0" compatLnSpc="0">
+            <a:normAutofit fontScale="95000" lnSpcReduction="1000"/>
+          </a:bodyPr>
+          <a:lstStyle/>
+          <a:p>
+            <a:pPr marL="342900" lvl="0" indent="-342900" algn="l">
+              <a:lnSpc>
+                <a:spcPct val="114999"/>
+              </a:lnSpc>
+              <a:spcBef>
+                <a:spcPts val="0"/>
+              </a:spcBef>
+              <a:spcAft>
+                <a:spcPts val="0"/>
+              </a:spcAft>
+              <a:buClr>
+                <a:srgbClr val="0F243E"/>
+              </a:buClr>
+              <a:buSzPts val="3200"/>
+              <a:buChar char="•"/>
+              <a:defRPr/>
+            </a:pPr>
+            <a:r>
+              <a:rPr lang="en-US">
+                <a:latin typeface="Arial"/>
+                <a:ea typeface="Arial"/>
+                <a:cs typeface="Arial"/>
+              </a:rPr>
+              <a:t>Secure Computing Mode</a:t>
+            </a:r>
+            <a:endParaRPr lang="en-US">
+              <a:latin typeface="Arial"/>
+              <a:ea typeface="Arial"/>
+              <a:cs typeface="Arial"/>
+            </a:endParaRPr>
+          </a:p>
+          <a:p>
+            <a:pPr marL="342900" lvl="0" indent="-342900" algn="l">
+              <a:lnSpc>
+                <a:spcPct val="114999"/>
+              </a:lnSpc>
+              <a:spcBef>
+                <a:spcPts val="0"/>
+              </a:spcBef>
+              <a:spcAft>
+                <a:spcPts val="0"/>
+              </a:spcAft>
+              <a:buClr>
+                <a:srgbClr val="0F243E"/>
+              </a:buClr>
+              <a:buSzPts val="3200"/>
+              <a:buChar char="•"/>
+              <a:defRPr/>
+            </a:pPr>
+            <a:r>
+              <a:rPr lang="en-US">
+                <a:latin typeface="Arial"/>
+                <a:ea typeface="Arial"/>
+                <a:cs typeface="Arial"/>
+              </a:rPr>
+              <a:t>Linux kernel feature</a:t>
+            </a:r>
+            <a:endParaRPr lang="en-US">
+              <a:latin typeface="Arial"/>
+              <a:ea typeface="Arial"/>
+              <a:cs typeface="Arial"/>
+            </a:endParaRPr>
+          </a:p>
+          <a:p>
+            <a:pPr marL="342900" lvl="0" indent="-342900" algn="l">
+              <a:lnSpc>
+                <a:spcPct val="114999"/>
+              </a:lnSpc>
+              <a:spcBef>
+                <a:spcPts val="0"/>
+              </a:spcBef>
+              <a:spcAft>
+                <a:spcPts val="0"/>
+              </a:spcAft>
+              <a:buClr>
+                <a:srgbClr val="0F243E"/>
+              </a:buClr>
+              <a:buSzPts val="3200"/>
+              <a:buChar char="•"/>
+              <a:defRPr/>
+            </a:pPr>
+            <a:r>
+              <a:rPr lang="en-US">
+                <a:latin typeface="Arial"/>
+                <a:ea typeface="Arial"/>
+                <a:cs typeface="Arial"/>
+              </a:rPr>
+              <a:t>Blocks syscalls</a:t>
+            </a:r>
+            <a:endParaRPr lang="en-US">
+              <a:latin typeface="Arial"/>
+              <a:ea typeface="Arial"/>
+              <a:cs typeface="Arial"/>
+            </a:endParaRPr>
+          </a:p>
+          <a:p>
+            <a:pPr marL="342900" lvl="0" indent="-342900" algn="l">
+              <a:lnSpc>
+                <a:spcPct val="114999"/>
+              </a:lnSpc>
+              <a:spcBef>
+                <a:spcPts val="0"/>
+              </a:spcBef>
+              <a:spcAft>
+                <a:spcPts val="0"/>
+              </a:spcAft>
+              <a:buClr>
+                <a:srgbClr val="0F243E"/>
+              </a:buClr>
+              <a:buSzPts val="3200"/>
+              <a:buChar char="•"/>
+              <a:defRPr/>
+            </a:pPr>
+            <a:r>
+              <a:rPr lang="en-US">
+                <a:latin typeface="Arial"/>
+                <a:ea typeface="Arial"/>
+                <a:cs typeface="Arial"/>
+              </a:rPr>
+              <a:t>Docker default profile</a:t>
+            </a:r>
+            <a:endParaRPr lang="en-US">
+              <a:latin typeface="Arial"/>
+              <a:ea typeface="Arial"/>
+              <a:cs typeface="Arial"/>
+            </a:endParaRPr>
+          </a:p>
+          <a:p>
+            <a:pPr marL="742950" lvl="1" indent="-342900" algn="l">
+              <a:lnSpc>
+                <a:spcPct val="114999"/>
+              </a:lnSpc>
+              <a:spcBef>
+                <a:spcPts val="0"/>
+              </a:spcBef>
+              <a:spcAft>
+                <a:spcPts val="0"/>
+              </a:spcAft>
+              <a:buClr>
+                <a:srgbClr val="0F243E"/>
+              </a:buClr>
+              <a:buSzPts val="3200"/>
+              <a:buChar char="•"/>
+              <a:defRPr/>
+            </a:pPr>
+            <a:r>
+              <a:rPr lang="en-US">
+                <a:latin typeface="Arial"/>
+                <a:ea typeface="Arial"/>
+                <a:cs typeface="Arial"/>
+              </a:rPr>
+              <a:t>finit_module</a:t>
+            </a:r>
+            <a:endParaRPr lang="en-US">
+              <a:latin typeface="Arial"/>
+              <a:ea typeface="Arial"/>
+              <a:cs typeface="Arial"/>
+            </a:endParaRPr>
+          </a:p>
+          <a:p>
+            <a:pPr marL="742950" lvl="1" indent="-342900" algn="l">
+              <a:lnSpc>
+                <a:spcPct val="114999"/>
+              </a:lnSpc>
+              <a:spcBef>
+                <a:spcPts val="0"/>
+              </a:spcBef>
+              <a:spcAft>
+                <a:spcPts val="0"/>
+              </a:spcAft>
+              <a:buClr>
+                <a:srgbClr val="0F243E"/>
+              </a:buClr>
+              <a:buSzPts val="3200"/>
+              <a:buChar char="•"/>
+              <a:defRPr/>
+            </a:pPr>
+            <a:r>
+              <a:rPr lang="en-US">
+                <a:latin typeface="Arial"/>
+                <a:ea typeface="Arial"/>
+                <a:cs typeface="Arial"/>
+              </a:rPr>
+              <a:t>reboot</a:t>
+            </a:r>
+            <a:endParaRPr lang="en-US">
+              <a:latin typeface="Arial"/>
+              <a:ea typeface="Arial"/>
+              <a:cs typeface="Arial"/>
+            </a:endParaRPr>
+          </a:p>
+          <a:p>
+            <a:pPr marL="742950" lvl="1" indent="-342900" algn="l">
+              <a:lnSpc>
+                <a:spcPct val="114999"/>
+              </a:lnSpc>
+              <a:spcBef>
+                <a:spcPts val="0"/>
+              </a:spcBef>
+              <a:spcAft>
+                <a:spcPts val="0"/>
+              </a:spcAft>
+              <a:buClr>
+                <a:srgbClr val="0F243E"/>
+              </a:buClr>
+              <a:buSzPts val="3200"/>
+              <a:buChar char="•"/>
+              <a:defRPr/>
+            </a:pPr>
+            <a:r>
+              <a:rPr lang="en-US">
+                <a:latin typeface="Arial"/>
+                <a:ea typeface="Arial"/>
+                <a:cs typeface="Arial"/>
+              </a:rPr>
+              <a:t>ptrace</a:t>
+            </a:r>
+            <a:endParaRPr lang="en-US">
+              <a:latin typeface="Arial"/>
+              <a:ea typeface="Arial"/>
+              <a:cs typeface="Arial"/>
+            </a:endParaRPr>
+          </a:p>
+          <a:p>
+            <a:pPr marL="742950" lvl="1" indent="-342900" algn="l">
+              <a:lnSpc>
+                <a:spcPct val="114999"/>
+              </a:lnSpc>
+              <a:spcBef>
+                <a:spcPts val="0"/>
+              </a:spcBef>
+              <a:spcAft>
+                <a:spcPts val="0"/>
+              </a:spcAft>
+              <a:buClr>
+                <a:srgbClr val="0F243E"/>
+              </a:buClr>
+              <a:buSzPts val="3200"/>
+              <a:buChar char="•"/>
+              <a:defRPr/>
+            </a:pPr>
+            <a:r>
+              <a:rPr lang="en-US">
+                <a:latin typeface="Arial"/>
+                <a:ea typeface="Arial"/>
+                <a:cs typeface="Arial"/>
+              </a:rPr>
+              <a:t>...</a:t>
+            </a:r>
+            <a:endParaRPr lang="en-US">
+              <a:latin typeface="Arial"/>
+              <a:ea typeface="Arial"/>
+              <a:cs typeface="Arial"/>
+            </a:endParaRPr>
+          </a:p>
+          <a:p>
+            <a:pPr marL="742950" lvl="1" indent="-342900" algn="l">
+              <a:lnSpc>
+                <a:spcPct val="114999"/>
+              </a:lnSpc>
+              <a:spcBef>
+                <a:spcPts val="0"/>
+              </a:spcBef>
+              <a:spcAft>
+                <a:spcPts val="0"/>
+              </a:spcAft>
+              <a:buClr>
+                <a:srgbClr val="0F243E"/>
+              </a:buClr>
+              <a:buSzPts val="3200"/>
+              <a:buChar char="•"/>
+              <a:defRPr/>
+            </a:pPr>
+            <a:endParaRPr lang="en-US">
+              <a:latin typeface="Arial"/>
+              <a:ea typeface="Arial"/>
+              <a:cs typeface="Arial"/>
+            </a:endParaRPr>
+          </a:p>
+        </p:txBody>
+      </p:sp>
+      <p:sp>
+        <p:nvSpPr>
+          <p:cNvPr id="1076045094" name=""/>
+          <p:cNvSpPr/>
+          <p:nvPr/>
+        </p:nvSpPr>
+        <p:spPr bwMode="auto">
+          <a:xfrm flipH="0" flipV="0">
+            <a:off x="6668853" y="1336145"/>
+            <a:ext cx="2588078" cy="886353"/>
+          </a:xfrm>
+          <a:prstGeom prst="rect">
+            <a:avLst/>
+          </a:prstGeom>
+          <a:solidFill>
+            <a:schemeClr val="accent5"/>
+          </a:solidFill>
+        </p:spPr>
+        <p:style>
+          <a:lnRef idx="2">
+            <a:schemeClr val="accent1">
+              <a:shade val="50000"/>
+            </a:schemeClr>
+          </a:lnRef>
+          <a:fillRef idx="1">
+            <a:schemeClr val="accent1"/>
+          </a:fillRef>
+          <a:effectRef idx="0">
+            <a:schemeClr val="accent1"/>
+          </a:effectRef>
+          <a:fontRef idx="minor">
+            <a:schemeClr val="lt1"/>
+          </a:fontRef>
+        </p:style>
+        <p:txBody>
+          <a:bodyPr/>
+          <a:p>
+            <a:pPr algn="ctr">
+              <a:defRPr/>
+            </a:pPr>
+            <a:r>
+              <a:rPr sz="2800"/>
+              <a:t>Container</a:t>
+            </a:r>
+            <a:endParaRPr sz="2800"/>
+          </a:p>
+        </p:txBody>
+      </p:sp>
+      <p:sp>
+        <p:nvSpPr>
+          <p:cNvPr id="1154903434" name=""/>
+          <p:cNvSpPr/>
+          <p:nvPr/>
+        </p:nvSpPr>
+        <p:spPr bwMode="auto">
+          <a:xfrm flipH="0" flipV="0">
+            <a:off x="6759212" y="4216135"/>
+            <a:ext cx="5229005" cy="886353"/>
+          </a:xfrm>
+          <a:prstGeom prst="rect">
+            <a:avLst/>
+          </a:prstGeom>
+          <a:solidFill>
+            <a:schemeClr val="accent5"/>
+          </a:solidFill>
+        </p:spPr>
+        <p:style>
+          <a:lnRef idx="2">
+            <a:schemeClr val="accent1">
+              <a:shade val="50000"/>
+            </a:schemeClr>
+          </a:lnRef>
+          <a:fillRef idx="1">
+            <a:schemeClr val="accent1"/>
+          </a:fillRef>
+          <a:effectRef idx="0">
+            <a:schemeClr val="accent1"/>
+          </a:effectRef>
+          <a:fontRef idx="minor">
+            <a:schemeClr val="lt1"/>
+          </a:fontRef>
+        </p:style>
+        <p:txBody>
+          <a:bodyPr/>
+          <a:p>
+            <a:pPr algn="ctr">
+              <a:defRPr/>
+            </a:pPr>
+            <a:r>
+              <a:rPr sz="2800"/>
+              <a:t>Kernel</a:t>
+            </a:r>
+            <a:endParaRPr sz="2800"/>
+          </a:p>
+        </p:txBody>
+      </p:sp>
+      <p:sp>
+        <p:nvSpPr>
+          <p:cNvPr id="1520623193" name=""/>
+          <p:cNvSpPr/>
+          <p:nvPr/>
+        </p:nvSpPr>
+        <p:spPr bwMode="auto">
+          <a:xfrm flipH="0" flipV="0">
+            <a:off x="7630992" y="2225912"/>
+            <a:ext cx="721178" cy="625928"/>
+          </a:xfrm>
+          <a:prstGeom prst="downArrow">
+            <a:avLst>
+              <a:gd name="adj1" fmla="val 50000"/>
+              <a:gd name="adj2" fmla="val 50000"/>
+            </a:avLst>
+          </a:prstGeom>
+          <a:solidFill>
+            <a:schemeClr val="accent5"/>
+          </a:solidFill>
+        </p:spPr>
+        <p:style>
+          <a:lnRef idx="2">
+            <a:schemeClr val="accent1">
+              <a:shade val="50000"/>
+            </a:schemeClr>
+          </a:lnRef>
+          <a:fillRef idx="1">
+            <a:schemeClr val="accent1"/>
+          </a:fillRef>
+          <a:effectRef idx="0">
+            <a:schemeClr val="accent1"/>
+          </a:effectRef>
+          <a:fontRef idx="minor">
+            <a:schemeClr val="lt1"/>
+          </a:fontRef>
+        </p:style>
+      </p:sp>
+      <p:sp>
+        <p:nvSpPr>
+          <p:cNvPr id="1606931137" name=""/>
+          <p:cNvSpPr/>
+          <p:nvPr/>
+        </p:nvSpPr>
+        <p:spPr bwMode="auto">
+          <a:xfrm flipH="0" flipV="0">
+            <a:off x="7630992" y="3590206"/>
+            <a:ext cx="721177" cy="625927"/>
+          </a:xfrm>
+          <a:prstGeom prst="downArrow">
+            <a:avLst>
+              <a:gd name="adj1" fmla="val 50000"/>
+              <a:gd name="adj2" fmla="val 50000"/>
+            </a:avLst>
+          </a:prstGeom>
+          <a:solidFill>
+            <a:schemeClr val="accent5"/>
+          </a:solidFill>
+        </p:spPr>
+        <p:style>
+          <a:lnRef idx="2">
+            <a:schemeClr val="accent1">
+              <a:shade val="50000"/>
+            </a:schemeClr>
+          </a:lnRef>
+          <a:fillRef idx="1">
+            <a:schemeClr val="accent1"/>
+          </a:fillRef>
+          <a:effectRef idx="0">
+            <a:schemeClr val="accent1"/>
+          </a:effectRef>
+          <a:fontRef idx="minor">
+            <a:schemeClr val="lt1"/>
+          </a:fontRef>
+        </p:style>
+      </p:sp>
+      <p:sp>
+        <p:nvSpPr>
+          <p:cNvPr id="1187889726" name=""/>
+          <p:cNvSpPr/>
+          <p:nvPr/>
+        </p:nvSpPr>
+        <p:spPr bwMode="auto">
+          <a:xfrm flipH="0" flipV="0">
+            <a:off x="6668853" y="2851840"/>
+            <a:ext cx="2524143" cy="738366"/>
+          </a:xfrm>
+          <a:prstGeom prst="rect">
+            <a:avLst/>
+          </a:prstGeom>
+          <a:solidFill>
+            <a:schemeClr val="accent5"/>
+          </a:solidFill>
+        </p:spPr>
+        <p:style>
+          <a:lnRef idx="2">
+            <a:schemeClr val="accent1">
+              <a:shade val="50000"/>
+            </a:schemeClr>
+          </a:lnRef>
+          <a:fillRef idx="1">
+            <a:schemeClr val="accent1"/>
+          </a:fillRef>
+          <a:effectRef idx="0">
+            <a:schemeClr val="accent1"/>
+          </a:effectRef>
+          <a:fontRef idx="minor">
+            <a:schemeClr val="lt1"/>
+          </a:fontRef>
+        </p:style>
+        <p:txBody>
+          <a:bodyPr/>
+          <a:p>
+            <a:pPr algn="ctr">
+              <a:defRPr/>
+            </a:pPr>
+            <a:r>
+              <a:rPr sz="2800"/>
+              <a:t>System Call</a:t>
+            </a:r>
+            <a:endParaRPr sz="2800"/>
+          </a:p>
+        </p:txBody>
+      </p:sp>
+      <p:sp>
+        <p:nvSpPr>
+          <p:cNvPr id="901644690" name=""/>
+          <p:cNvSpPr/>
+          <p:nvPr/>
+        </p:nvSpPr>
+        <p:spPr bwMode="auto">
+          <a:xfrm flipH="0" flipV="0">
+            <a:off x="9373715" y="1336145"/>
+            <a:ext cx="2640926" cy="886353"/>
+          </a:xfrm>
+          <a:prstGeom prst="rect">
+            <a:avLst/>
+          </a:prstGeom>
+          <a:solidFill>
+            <a:schemeClr val="accent5"/>
+          </a:solidFill>
+        </p:spPr>
+        <p:style>
+          <a:lnRef idx="2">
+            <a:schemeClr val="accent1">
+              <a:shade val="50000"/>
+            </a:schemeClr>
+          </a:lnRef>
+          <a:fillRef idx="1">
+            <a:schemeClr val="accent1"/>
+          </a:fillRef>
+          <a:effectRef idx="0">
+            <a:schemeClr val="accent1"/>
+          </a:effectRef>
+          <a:fontRef idx="minor">
+            <a:schemeClr val="lt1"/>
+          </a:fontRef>
+        </p:style>
+        <p:txBody>
+          <a:bodyPr/>
+          <a:p>
+            <a:pPr algn="ctr">
+              <a:defRPr/>
+            </a:pPr>
+            <a:r>
+              <a:rPr sz="2800"/>
+              <a:t>Host</a:t>
+            </a:r>
+            <a:endParaRPr sz="2800"/>
+          </a:p>
+        </p:txBody>
+      </p:sp>
+      <p:sp>
+        <p:nvSpPr>
+          <p:cNvPr id="1884903272" name=""/>
+          <p:cNvSpPr/>
+          <p:nvPr/>
+        </p:nvSpPr>
+        <p:spPr bwMode="auto">
+          <a:xfrm flipH="0" flipV="0">
+            <a:off x="9373715" y="2851840"/>
+            <a:ext cx="2524143" cy="738365"/>
+          </a:xfrm>
+          <a:prstGeom prst="rect">
+            <a:avLst/>
+          </a:prstGeom>
+          <a:solidFill>
+            <a:schemeClr val="accent5"/>
+          </a:solidFill>
+        </p:spPr>
+        <p:style>
+          <a:lnRef idx="2">
+            <a:schemeClr val="accent1">
+              <a:shade val="50000"/>
+            </a:schemeClr>
+          </a:lnRef>
+          <a:fillRef idx="1">
+            <a:schemeClr val="accent1"/>
+          </a:fillRef>
+          <a:effectRef idx="0">
+            <a:schemeClr val="accent1"/>
+          </a:effectRef>
+          <a:fontRef idx="minor">
+            <a:schemeClr val="lt1"/>
+          </a:fontRef>
+        </p:style>
+        <p:txBody>
+          <a:bodyPr/>
+          <a:p>
+            <a:pPr algn="ctr">
+              <a:defRPr/>
+            </a:pPr>
+            <a:r>
+              <a:rPr sz="2800"/>
+              <a:t>System Call</a:t>
+            </a:r>
+            <a:endParaRPr sz="2800"/>
+          </a:p>
+        </p:txBody>
+      </p:sp>
+      <p:sp>
+        <p:nvSpPr>
+          <p:cNvPr id="957139931" name=""/>
+          <p:cNvSpPr/>
+          <p:nvPr/>
+        </p:nvSpPr>
+        <p:spPr bwMode="auto">
+          <a:xfrm flipH="0" flipV="0">
+            <a:off x="10327927" y="3590206"/>
+            <a:ext cx="721177" cy="625927"/>
+          </a:xfrm>
+          <a:prstGeom prst="downArrow">
+            <a:avLst>
+              <a:gd name="adj1" fmla="val 50000"/>
+              <a:gd name="adj2" fmla="val 50000"/>
+            </a:avLst>
+          </a:prstGeom>
+          <a:solidFill>
+            <a:schemeClr val="accent5"/>
+          </a:solidFill>
+        </p:spPr>
+        <p:style>
+          <a:lnRef idx="2">
+            <a:schemeClr val="accent1">
+              <a:shade val="50000"/>
+            </a:schemeClr>
+          </a:lnRef>
+          <a:fillRef idx="1">
+            <a:schemeClr val="accent1"/>
+          </a:fillRef>
+          <a:effectRef idx="0">
+            <a:schemeClr val="accent1"/>
+          </a:effectRef>
+          <a:fontRef idx="minor">
+            <a:schemeClr val="lt1"/>
+          </a:fontRef>
+        </p:style>
+      </p:sp>
+      <p:sp>
+        <p:nvSpPr>
+          <p:cNvPr id="1460801642" name=""/>
+          <p:cNvSpPr/>
+          <p:nvPr/>
+        </p:nvSpPr>
+        <p:spPr bwMode="auto">
+          <a:xfrm flipH="0" flipV="0">
+            <a:off x="10327927" y="2225912"/>
+            <a:ext cx="721177" cy="625927"/>
+          </a:xfrm>
+          <a:prstGeom prst="downArrow">
+            <a:avLst>
+              <a:gd name="adj1" fmla="val 50000"/>
+              <a:gd name="adj2" fmla="val 50000"/>
+            </a:avLst>
+          </a:prstGeom>
+          <a:solidFill>
+            <a:schemeClr val="accent5"/>
+          </a:solidFill>
+        </p:spPr>
+        <p:style>
+          <a:lnRef idx="2">
+            <a:schemeClr val="accent1">
+              <a:shade val="50000"/>
+            </a:schemeClr>
+          </a:lnRef>
+          <a:fillRef idx="1">
+            <a:schemeClr val="accent1"/>
+          </a:fillRef>
+          <a:effectRef idx="0">
+            <a:schemeClr val="accent1"/>
+          </a:effectRef>
+          <a:fontRef idx="minor">
+            <a:schemeClr val="lt1"/>
+          </a:fontRef>
+        </p:style>
+      </p:sp>
+    </p:spTree>
+  </p:cSld>
+  <p:clrMapOvr>
+    <a:masterClrMapping/>
+  </p:clrMapOvr>
+  <mc:AlternateContent xmlns:mc="http://schemas.openxmlformats.org/markup-compatibility/2006">
+    <mc:Choice xmlns:p14="http://schemas.microsoft.com/office/powerpoint/2010/main" Requires="p14">
+      <p:transition p14:dur="2000" advClick="1"/>
+    </mc:Choice>
+    <mc:Fallback>
+      <p:transition advClick="1"/>
+    </mc:Fallback>
+  </mc:AlternateContent>
+</p:sld>
+</file>
+
+<file path=ppt/slides/slide12.xml><?xml version="1.0" encoding="utf-8"?>
+<p:sld xmlns:a="http://schemas.openxmlformats.org/drawingml/2006/main" xmlns:r="http://schemas.openxmlformats.org/officeDocument/2006/relationships" xmlns:p="http://schemas.openxmlformats.org/presentationml/2006/main" xmlns:m="http://schemas.openxmlformats.org/officeDocument/2006/math" xmlns:w="http://schemas.openxmlformats.org/wordprocessingml/2006/main" showMasterPhAnim="0" show="1">
+  <p:cSld name="">
+    <p:spTree>
+      <p:nvGrpSpPr>
+        <p:cNvPr id="1" name=""/>
+        <p:cNvGrpSpPr/>
+        <p:nvPr/>
+      </p:nvGrpSpPr>
+      <p:grpSpPr bwMode="auto">
+        <a:xfrm>
+          <a:off x="0" y="0"/>
+          <a:ext cx="0" cy="0"/>
+          <a:chOff x="0" y="0"/>
+          <a:chExt cx="0" cy="0"/>
+        </a:xfrm>
+      </p:grpSpPr>
+      <p:sp>
+        <p:nvSpPr>
+          <p:cNvPr id="1250075880" name="Google Shape;419;p22"/>
+          <p:cNvSpPr txBox="1"/>
+          <p:nvPr>
+            <p:ph type="title"/>
+          </p:nvPr>
+        </p:nvSpPr>
+        <p:spPr bwMode="auto">
+          <a:xfrm>
+            <a:off x="2676486" y="220638"/>
+            <a:ext cx="6750077" cy="856126"/>
+          </a:xfrm>
+          <a:prstGeom prst="rect">
+            <a:avLst/>
+          </a:prstGeom>
+          <a:solidFill>
+            <a:schemeClr val="lt1">
+              <a:alpha val="83921"/>
+            </a:schemeClr>
+          </a:solidFill>
+          <a:ln>
+            <a:noFill/>
+          </a:ln>
+        </p:spPr>
+        <p:txBody>
+          <a:bodyPr spcFirstLastPara="1" wrap="square" lIns="91424" tIns="45699" rIns="91424" bIns="45699" anchor="ctr" anchorCtr="0">
+            <a:normAutofit/>
+          </a:bodyPr>
+          <a:lstStyle/>
+          <a:p>
+            <a:pPr marL="0" lvl="0" indent="0" algn="ctr">
+              <a:spcBef>
+                <a:spcPts val="0"/>
+              </a:spcBef>
+              <a:spcAft>
+                <a:spcPts val="0"/>
+              </a:spcAft>
+              <a:buClr>
+                <a:srgbClr val="00007F"/>
+              </a:buClr>
+              <a:buSzPts val="3200"/>
+              <a:buFont typeface="Arial"/>
+              <a:buNone/>
+              <a:defRPr/>
+            </a:pPr>
+            <a:r>
+              <a:rPr lang="en-US"/>
+              <a:t>seccomp</a:t>
+            </a:r>
+            <a:endParaRPr/>
+          </a:p>
+        </p:txBody>
+      </p:sp>
+      <p:sp>
+        <p:nvSpPr>
+          <p:cNvPr id="1437401899" name="Google Shape;420;p22"/>
+          <p:cNvSpPr txBox="1"/>
+          <p:nvPr>
+            <p:ph type="body" idx="1"/>
+          </p:nvPr>
+        </p:nvSpPr>
+        <p:spPr bwMode="auto">
+          <a:xfrm>
+            <a:off x="609598" y="1340766"/>
+            <a:ext cx="10972800" cy="4608513"/>
+          </a:xfrm>
+          <a:prstGeom prst="rect">
+            <a:avLst/>
+          </a:prstGeom>
+          <a:noFill/>
+          <a:ln>
+            <a:noFill/>
+          </a:ln>
+        </p:spPr>
+        <p:txBody>
+          <a:bodyPr spcFirstLastPara="1" vertOverflow="overflow" horzOverflow="overflow" vert="horz" wrap="square" lIns="91424" tIns="45699" rIns="91424" bIns="45699" numCol="1" spcCol="0" rtlCol="0" fromWordArt="0" anchor="t" anchorCtr="0" forceAA="0" upright="0" compatLnSpc="0">
+            <a:normAutofit/>
+          </a:bodyPr>
+          <a:lstStyle/>
+          <a:p>
+            <a:pPr marL="400050" lvl="1" indent="0" algn="l">
+              <a:lnSpc>
+                <a:spcPct val="114999"/>
+              </a:lnSpc>
+              <a:spcBef>
+                <a:spcPts val="0"/>
+              </a:spcBef>
+              <a:spcAft>
+                <a:spcPts val="0"/>
+              </a:spcAft>
+              <a:buClr>
+                <a:srgbClr val="0F243E"/>
+              </a:buClr>
+              <a:buSzPts val="3200"/>
+              <a:buFont typeface="Arial"/>
+              <a:buNone/>
+              <a:defRPr/>
+            </a:pPr>
+            <a:endParaRPr lang="en-US">
+              <a:latin typeface="Arial"/>
+              <a:ea typeface="Arial"/>
+              <a:cs typeface="Arial"/>
+            </a:endParaRPr>
+          </a:p>
+        </p:txBody>
+      </p:sp>
+      <p:sp>
+        <p:nvSpPr>
+          <p:cNvPr id="21196338" name="Google Shape;422;p22"/>
+          <p:cNvSpPr txBox="1"/>
+          <p:nvPr/>
+        </p:nvSpPr>
+        <p:spPr bwMode="auto">
+          <a:xfrm>
+            <a:off x="3265745" y="5431894"/>
+            <a:ext cx="5571559" cy="366079"/>
+          </a:xfrm>
+          <a:prstGeom prst="rect">
+            <a:avLst/>
+          </a:prstGeom>
+          <a:noFill/>
+          <a:ln>
+            <a:noFill/>
+          </a:ln>
+        </p:spPr>
+        <p:txBody>
+          <a:bodyPr spcFirstLastPara="1" wrap="square" lIns="91424" tIns="45699" rIns="91424" bIns="45699" anchor="t" anchorCtr="0">
+            <a:spAutoFit/>
+          </a:bodyPr>
+          <a:lstStyle/>
+          <a:p>
+            <a:pPr marL="0" marR="0" lvl="0" indent="0" algn="ctr">
+              <a:spcBef>
+                <a:spcPts val="0"/>
+              </a:spcBef>
+              <a:spcAft>
+                <a:spcPts val="0"/>
+              </a:spcAft>
+              <a:buNone/>
+              <a:defRPr/>
+            </a:pPr>
+            <a:r>
+              <a:rPr lang="en-US" sz="1800" b="0" i="0" u="none" strike="noStrike" cap="none">
+                <a:solidFill>
+                  <a:schemeClr val="dk1"/>
+                </a:solidFill>
+                <a:latin typeface="Arial"/>
+                <a:ea typeface="Arial"/>
+                <a:cs typeface="Arial"/>
+              </a:rPr>
+              <a:t>Custom seccomp profile</a:t>
+            </a:r>
+            <a:endParaRPr sz="1800" b="0" i="0" u="none" strike="noStrike" cap="none">
+              <a:solidFill>
+                <a:schemeClr val="dk1"/>
+              </a:solidFill>
+              <a:latin typeface="Arial"/>
+              <a:ea typeface="Arial"/>
+              <a:cs typeface="Arial"/>
+            </a:endParaRPr>
+          </a:p>
+        </p:txBody>
+      </p:sp>
+      <p:pic>
+        <p:nvPicPr>
+          <p:cNvPr id="153978150" name=""/>
+          <p:cNvPicPr>
+            <a:picLocks noChangeAspect="1"/>
+          </p:cNvPicPr>
+          <p:nvPr/>
+        </p:nvPicPr>
+        <p:blipFill>
+          <a:blip r:embed="rId2"/>
+          <a:stretch/>
+        </p:blipFill>
+        <p:spPr bwMode="auto">
+          <a:xfrm flipH="0" flipV="0">
+            <a:off x="781233" y="1433370"/>
+            <a:ext cx="10629529" cy="3699545"/>
+          </a:xfrm>
+          <a:prstGeom prst="rect">
+            <a:avLst/>
+          </a:prstGeom>
+        </p:spPr>
+      </p:pic>
+    </p:spTree>
+  </p:cSld>
+  <p:clrMapOvr>
+    <a:masterClrMapping/>
+  </p:clrMapOvr>
+  <mc:AlternateContent xmlns:mc="http://schemas.openxmlformats.org/markup-compatibility/2006">
+    <mc:Choice xmlns:p14="http://schemas.microsoft.com/office/powerpoint/2010/main" Requires="p14">
+      <p:transition p14:dur="2000" advClick="1"/>
+    </mc:Choice>
+    <mc:Fallback>
+      <p:transition advClick="1"/>
+    </mc:Fallback>
+  </mc:AlternateContent>
+</p:sld>
+</file>
+
+<file path=ppt/slides/slide13.xml><?xml version="1.0" encoding="utf-8"?>
 <p:sld xmlns:a="http://schemas.openxmlformats.org/drawingml/2006/main" xmlns:r="http://schemas.openxmlformats.org/officeDocument/2006/relationships" xmlns:p="http://schemas.openxmlformats.org/presentationml/2006/main" xmlns:m="http://schemas.openxmlformats.org/officeDocument/2006/math" xmlns:w="http://schemas.openxmlformats.org/wordprocessingml/2006/main" showMasterPhAnim="0" show="1">
   <p:cSld name="">
     <p:spTree>
@@ -23930,7 +21819,7 @@
     <a:masterClrMapping/>
   </p:clrMapOvr>
   <mc:AlternateContent xmlns:mc="http://schemas.openxmlformats.org/markup-compatibility/2006">
-    <mc:Choice xmlns:p159="http://schemas.microsoft.com/office/powerpoint/2015/09/main" xmlns:p14="http://schemas.microsoft.com/office/powerpoint/2010/main" Requires="p159">
+    <mc:Choice xmlns:p14="http://schemas.microsoft.com/office/powerpoint/2010/main" Requires="p14">
       <p:transition p14:dur="2000" advClick="1"/>
     </mc:Choice>
     <mc:Fallback>
@@ -23940,7 +21829,7 @@
 </p:sld>
 </file>
 
-<file path=ppt/slides/slide12.xml><?xml version="1.0" encoding="utf-8"?>
+<file path=ppt/slides/slide14.xml><?xml version="1.0" encoding="utf-8"?>
 <p:sld xmlns:a="http://schemas.openxmlformats.org/drawingml/2006/main" xmlns:r="http://schemas.openxmlformats.org/officeDocument/2006/relationships" xmlns:p="http://schemas.openxmlformats.org/presentationml/2006/main" xmlns:m="http://schemas.openxmlformats.org/officeDocument/2006/math" xmlns:w="http://schemas.openxmlformats.org/wordprocessingml/2006/main" showMasterPhAnim="0" show="1">
   <p:cSld name="">
     <p:spTree>
@@ -24391,7 +22280,7 @@
           <p:nvPr/>
         </p:nvPicPr>
         <p:blipFill>
-          <a:blip r:embed="rId3">
+          <a:blip r:embed="rId2">
             <a:alphaModFix/>
           </a:blip>
           <a:srcRect l="0" t="0" r="0" b="0"/>
@@ -24529,7 +22418,7 @@
                 <a:latin typeface="Arial"/>
                 <a:ea typeface="Arial"/>
                 <a:cs typeface="Arial"/>
-                <a:hlinkClick r:id="rId4" tooltip="https://www.crowdstrike.com/blog/exploiting-cve-2021-3490-for-container-escapes/"/>
+                <a:hlinkClick r:id="rId3" tooltip="https://www.crowdstrike.com/blog/exploiting-cve-2021-3490-for-container-escapes/"/>
               </a:rPr>
               <a:t>www.crowdstrike.com</a:t>
             </a:r>
@@ -24581,7 +22470,7 @@
     <a:masterClrMapping/>
   </p:clrMapOvr>
   <mc:AlternateContent xmlns:mc="http://schemas.openxmlformats.org/markup-compatibility/2006">
-    <mc:Choice xmlns:p159="http://schemas.microsoft.com/office/powerpoint/2015/09/main" xmlns:p14="http://schemas.microsoft.com/office/powerpoint/2010/main" Requires="p159">
+    <mc:Choice xmlns:p14="http://schemas.microsoft.com/office/powerpoint/2010/main" Requires="p14">
       <p:transition p14:dur="2000" advClick="1"/>
     </mc:Choice>
     <mc:Fallback>
@@ -24591,7 +22480,7 @@
 </p:sld>
 </file>
 
-<file path=ppt/slides/slide13.xml><?xml version="1.0" encoding="utf-8"?>
+<file path=ppt/slides/slide15.xml><?xml version="1.0" encoding="utf-8"?>
 <p:sld xmlns:a="http://schemas.openxmlformats.org/drawingml/2006/main" xmlns:r="http://schemas.openxmlformats.org/officeDocument/2006/relationships" xmlns:p="http://schemas.openxmlformats.org/presentationml/2006/main" xmlns:m="http://schemas.openxmlformats.org/officeDocument/2006/math" xmlns:w="http://schemas.openxmlformats.org/wordprocessingml/2006/main" showMasterPhAnim="0" show="1">
   <p:cSld name="">
     <p:spTree>
@@ -24634,7 +22523,7 @@
           </a:ln>
         </p:spPr>
         <p:txBody>
-          <a:bodyPr spcFirstLastPara="1" wrap="square" lIns="91424" tIns="45699" rIns="91424" bIns="45699" anchor="ctr" anchorCtr="0">
+          <a:bodyPr spcFirstLastPara="1" wrap="square" lIns="91423" tIns="45699" rIns="91423" bIns="45699" anchor="ctr" anchorCtr="0">
             <a:normAutofit/>
           </a:bodyPr>
           <a:lstStyle>
@@ -24762,7 +22651,7 @@
           <p:nvPr/>
         </p:nvPicPr>
         <p:blipFill>
-          <a:blip r:embed="rId3"/>
+          <a:blip r:embed="rId2"/>
           <a:stretch/>
         </p:blipFill>
         <p:spPr bwMode="auto">
@@ -24805,7 +22694,7 @@
             </a:pPr>
             <a:r>
               <a:rPr lang="en-GB" u="sng">
-                <a:hlinkClick r:id="rId4" tooltip="https://fbr.io/join/xyucs"/>
+                <a:hlinkClick r:id="rId3" tooltip="https://fbr.io/join/xyucs"/>
               </a:rPr>
               <a:t>https://fbr.io/join/xyucs</a:t>
             </a:r>
@@ -24823,7 +22712,7 @@
     <a:masterClrMapping/>
   </p:clrMapOvr>
   <mc:AlternateContent xmlns:mc="http://schemas.openxmlformats.org/markup-compatibility/2006">
-    <mc:Choice xmlns:p159="http://schemas.microsoft.com/office/powerpoint/2015/09/main" xmlns:p14="http://schemas.microsoft.com/office/powerpoint/2010/main" Requires="p159">
+    <mc:Choice xmlns:p14="http://schemas.microsoft.com/office/powerpoint/2010/main" Requires="p14">
       <p:transition p14:dur="2000" advClick="1"/>
     </mc:Choice>
     <mc:Fallback>
@@ -25034,7 +22923,7 @@
     <a:masterClrMapping/>
   </p:clrMapOvr>
   <mc:AlternateContent xmlns:mc="http://schemas.openxmlformats.org/markup-compatibility/2006">
-    <mc:Choice xmlns:p159="http://schemas.microsoft.com/office/powerpoint/2015/09/main" xmlns:p14="http://schemas.microsoft.com/office/powerpoint/2010/main" Requires="p159">
+    <mc:Choice xmlns:p14="http://schemas.microsoft.com/office/powerpoint/2010/main" Requires="p14">
       <p:transition p14:dur="2000" advClick="1"/>
     </mc:Choice>
     <mc:Fallback>
@@ -25184,7 +23073,7 @@
     <a:masterClrMapping/>
   </p:clrMapOvr>
   <mc:AlternateContent xmlns:mc="http://schemas.openxmlformats.org/markup-compatibility/2006">
-    <mc:Choice xmlns:p159="http://schemas.microsoft.com/office/powerpoint/2015/09/main" xmlns:p14="http://schemas.microsoft.com/office/powerpoint/2010/main" Requires="p159">
+    <mc:Choice xmlns:p14="http://schemas.microsoft.com/office/powerpoint/2010/main" Requires="p14">
       <p:transition p14:dur="2000" advClick="1"/>
     </mc:Choice>
     <mc:Fallback>
@@ -25516,7 +23405,7 @@
           <p:nvPr/>
         </p:nvPicPr>
         <p:blipFill>
-          <a:blip r:embed="rId3">
+          <a:blip r:embed="rId2">
             <a:alphaModFix/>
           </a:blip>
           <a:srcRect l="0" t="0" r="0" b="0"/>
@@ -25654,7 +23543,7 @@
                 <a:latin typeface="Arial"/>
                 <a:ea typeface="Arial"/>
                 <a:cs typeface="Arial"/>
-                <a:hlinkClick r:id="rId4" tooltip="https://blog.aquasec.com/container-isolation-techniques"/>
+                <a:hlinkClick r:id="rId3" tooltip="https://blog.aquasec.com/container-isolation-techniques"/>
               </a:rPr>
               <a:t>blog.aquasec.com</a:t>
             </a:r>
@@ -25706,7 +23595,7 @@
     <a:masterClrMapping/>
   </p:clrMapOvr>
   <mc:AlternateContent xmlns:mc="http://schemas.openxmlformats.org/markup-compatibility/2006">
-    <mc:Choice xmlns:p159="http://schemas.microsoft.com/office/powerpoint/2015/09/main" xmlns:p14="http://schemas.microsoft.com/office/powerpoint/2010/main" Requires="p159">
+    <mc:Choice xmlns:p14="http://schemas.microsoft.com/office/powerpoint/2010/main" Requires="p14">
       <p:transition p14:dur="2000" advClick="1"/>
     </mc:Choice>
     <mc:Fallback>
@@ -26047,7 +23936,7 @@
           <p:nvPr/>
         </p:nvPicPr>
         <p:blipFill>
-          <a:blip r:embed="rId3">
+          <a:blip r:embed="rId2">
             <a:alphaModFix/>
           </a:blip>
           <a:srcRect l="0" t="0" r="0" b="0"/>
@@ -26185,7 +24074,7 @@
                 <a:latin typeface="Arial"/>
                 <a:ea typeface="Arial"/>
                 <a:cs typeface="Arial"/>
-                <a:hlinkClick r:id="rId4" tooltip="https://blog.aquasec.com/container-isolation-techniques"/>
+                <a:hlinkClick r:id="rId3" tooltip="https://blog.aquasec.com/container-isolation-techniques"/>
               </a:rPr>
               <a:t>blog.aquasec.com</a:t>
             </a:r>
@@ -26237,7 +24126,7 @@
     <a:masterClrMapping/>
   </p:clrMapOvr>
   <mc:AlternateContent xmlns:mc="http://schemas.openxmlformats.org/markup-compatibility/2006">
-    <mc:Choice xmlns:p159="http://schemas.microsoft.com/office/powerpoint/2015/09/main" xmlns:p14="http://schemas.microsoft.com/office/powerpoint/2010/main" Requires="p159">
+    <mc:Choice xmlns:p14="http://schemas.microsoft.com/office/powerpoint/2010/main" Requires="p14">
       <p:transition p14:dur="2000" advClick="1"/>
     </mc:Choice>
     <mc:Fallback>
@@ -26581,7 +24470,7 @@
           <p:nvPr/>
         </p:nvPicPr>
         <p:blipFill>
-          <a:blip r:embed="rId3">
+          <a:blip r:embed="rId2">
             <a:alphaModFix/>
           </a:blip>
           <a:srcRect l="0" t="0" r="0" b="0"/>
@@ -26719,7 +24608,7 @@
                 <a:latin typeface="Arial"/>
                 <a:ea typeface="Arial"/>
                 <a:cs typeface="Arial"/>
-                <a:hlinkClick r:id="rId4" tooltip="https://blog.aquasec.com/container-isolation-techniques"/>
+                <a:hlinkClick r:id="rId3" tooltip="https://blog.aquasec.com/container-isolation-techniques"/>
               </a:rPr>
               <a:t>blog.aquasec.com</a:t>
             </a:r>
@@ -26771,7 +24660,7 @@
     <a:masterClrMapping/>
   </p:clrMapOvr>
   <mc:AlternateContent xmlns:mc="http://schemas.openxmlformats.org/markup-compatibility/2006">
-    <mc:Choice xmlns:p159="http://schemas.microsoft.com/office/powerpoint/2015/09/main" xmlns:p14="http://schemas.microsoft.com/office/powerpoint/2010/main" Requires="p159">
+    <mc:Choice xmlns:p14="http://schemas.microsoft.com/office/powerpoint/2010/main" Requires="p14">
       <p:transition p14:dur="2000" advClick="1"/>
     </mc:Choice>
     <mc:Fallback>
@@ -26932,7 +24821,7 @@
     <a:masterClrMapping/>
   </p:clrMapOvr>
   <mc:AlternateContent xmlns:mc="http://schemas.openxmlformats.org/markup-compatibility/2006">
-    <mc:Choice xmlns:p159="http://schemas.microsoft.com/office/powerpoint/2015/09/main" xmlns:p14="http://schemas.microsoft.com/office/powerpoint/2010/main" Requires="p159">
+    <mc:Choice xmlns:p14="http://schemas.microsoft.com/office/powerpoint/2010/main" Requires="p14">
       <p:transition p14:dur="2000" advClick="1"/>
     </mc:Choice>
     <mc:Fallback>
@@ -27296,7 +25185,7 @@
           <p:nvPr/>
         </p:nvPicPr>
         <p:blipFill>
-          <a:blip r:embed="rId3">
+          <a:blip r:embed="rId2">
             <a:alphaModFix/>
           </a:blip>
           <a:srcRect l="0" t="0" r="0" b="0"/>
@@ -27434,7 +25323,7 @@
                 <a:latin typeface="Arial"/>
                 <a:ea typeface="Arial"/>
                 <a:cs typeface="Arial"/>
-                <a:hlinkClick r:id="rId4" tooltip="https://www.toptal.com/linux/separation-anxiety-isolating-your-system-with-linux-namespaces"/>
+                <a:hlinkClick r:id="rId3" tooltip="https://www.toptal.com/linux/separation-anxiety-isolating-your-system-with-linux-namespaces"/>
               </a:rPr>
               <a:t>www.toptal.com</a:t>
             </a:r>
@@ -27466,7 +25355,7 @@
     <a:masterClrMapping/>
   </p:clrMapOvr>
   <mc:AlternateContent xmlns:mc="http://schemas.openxmlformats.org/markup-compatibility/2006">
-    <mc:Choice xmlns:p159="http://schemas.microsoft.com/office/powerpoint/2015/09/main" xmlns:p14="http://schemas.microsoft.com/office/powerpoint/2010/main" Requires="p159">
+    <mc:Choice xmlns:p14="http://schemas.microsoft.com/office/powerpoint/2010/main" Requires="p14">
       <p:transition p14:dur="2000" advClick="1"/>
     </mc:Choice>
     <mc:Fallback>
@@ -27778,7 +25667,7 @@
           <p:nvPr/>
         </p:nvPicPr>
         <p:blipFill>
-          <a:blip r:embed="rId3">
+          <a:blip r:embed="rId2">
             <a:alphaModFix/>
           </a:blip>
           <a:srcRect l="0" t="0" r="0" b="0"/>
@@ -27916,7 +25805,7 @@
                 <a:latin typeface="Arial"/>
                 <a:ea typeface="Arial"/>
                 <a:cs typeface="Arial"/>
-                <a:hlinkClick r:id="rId4" tooltip="https://man7.org/linux/man-pages/man7/capabilities.7.html"/>
+                <a:hlinkClick r:id="rId3" tooltip="https://man7.org/linux/man-pages/man7/capabilities.7.html"/>
               </a:rPr>
               <a:t>man7.org</a:t>
             </a:r>
@@ -27968,7 +25857,7 @@
     <a:masterClrMapping/>
   </p:clrMapOvr>
   <mc:AlternateContent xmlns:mc="http://schemas.openxmlformats.org/markup-compatibility/2006">
-    <mc:Choice xmlns:p159="http://schemas.microsoft.com/office/powerpoint/2015/09/main" xmlns:p14="http://schemas.microsoft.com/office/powerpoint/2010/main" Requires="p159">
+    <mc:Choice xmlns:p14="http://schemas.microsoft.com/office/powerpoint/2010/main" Requires="p14">
       <p:transition p14:dur="2000" advClick="1"/>
     </mc:Choice>
     <mc:Fallback>
@@ -28181,209 +26070,4 @@
   </a:themeElements>
   <a:objectDefaults/>
 </a:theme>
-</file>
-
-<file path=ppt/theme/theme2.xml><?xml version="1.0" encoding="utf-8"?>
-<a:theme xmlns:a="http://schemas.openxmlformats.org/drawingml/2006/main" xmlns:r="http://schemas.openxmlformats.org/officeDocument/2006/relationships" xmlns:p="http://schemas.openxmlformats.org/presentationml/2006/main" name="Office Theme">
-  <a:themeElements>
-    <a:clrScheme name="Office">
-      <a:dk1>
-        <a:srgbClr val="000000"/>
-      </a:dk1>
-      <a:lt1>
-        <a:srgbClr val="FFFFFF"/>
-      </a:lt1>
-      <a:dk2>
-        <a:srgbClr val="44546A"/>
-      </a:dk2>
-      <a:lt2>
-        <a:srgbClr val="E7E6E6"/>
-      </a:lt2>
-      <a:accent1>
-        <a:srgbClr val="5B9BD5"/>
-      </a:accent1>
-      <a:accent2>
-        <a:srgbClr val="ED7D31"/>
-      </a:accent2>
-      <a:accent3>
-        <a:srgbClr val="A5A5A5"/>
-      </a:accent3>
-      <a:accent4>
-        <a:srgbClr val="FFC000"/>
-      </a:accent4>
-      <a:accent5>
-        <a:srgbClr val="4472C4"/>
-      </a:accent5>
-      <a:accent6>
-        <a:srgbClr val="70AD47"/>
-      </a:accent6>
-      <a:hlink>
-        <a:srgbClr val="0563C1"/>
-      </a:hlink>
-      <a:folHlink>
-        <a:srgbClr val="954F72"/>
-      </a:folHlink>
-    </a:clrScheme>
-    <a:fontScheme name="Office">
-      <a:majorFont>
-        <a:latin typeface="Arial"/>
-        <a:ea typeface="Arial"/>
-        <a:cs typeface="Arial"/>
-      </a:majorFont>
-      <a:minorFont>
-        <a:latin typeface="Arial"/>
-        <a:ea typeface="Arial"/>
-        <a:cs typeface="Arial"/>
-      </a:minorFont>
-    </a:fontScheme>
-    <a:fmtScheme name="Office">
-      <a:fillStyleLst>
-        <a:solidFill>
-          <a:schemeClr val="phClr"/>
-        </a:solidFill>
-        <a:gradFill>
-          <a:gsLst>
-            <a:gs pos="0">
-              <a:schemeClr val="phClr">
-                <a:tint val="50000"/>
-                <a:satMod val="300000"/>
-              </a:schemeClr>
-            </a:gs>
-            <a:gs pos="35000">
-              <a:schemeClr val="phClr">
-                <a:tint val="37000"/>
-                <a:satMod val="300000"/>
-              </a:schemeClr>
-            </a:gs>
-            <a:gs pos="100000">
-              <a:schemeClr val="phClr">
-                <a:tint val="15000"/>
-                <a:satMod val="350000"/>
-              </a:schemeClr>
-            </a:gs>
-          </a:gsLst>
-          <a:lin ang="16200000" scaled="1"/>
-        </a:gradFill>
-        <a:gradFill>
-          <a:gsLst>
-            <a:gs pos="0">
-              <a:schemeClr val="phClr">
-                <a:tint val="100000"/>
-                <a:shade val="100000"/>
-                <a:satMod val="130000"/>
-              </a:schemeClr>
-            </a:gs>
-            <a:gs pos="100000">
-              <a:schemeClr val="phClr">
-                <a:tint val="50000"/>
-                <a:shade val="100000"/>
-                <a:satMod val="350000"/>
-              </a:schemeClr>
-            </a:gs>
-          </a:gsLst>
-          <a:lin ang="16200000" scaled="0"/>
-        </a:gradFill>
-      </a:fillStyleLst>
-      <a:lnStyleLst>
-        <a:ln w="9525" cap="flat" cmpd="sng" algn="ctr">
-          <a:solidFill>
-            <a:schemeClr val="phClr">
-              <a:shade val="95000"/>
-              <a:satMod val="105000"/>
-            </a:schemeClr>
-          </a:solidFill>
-          <a:prstDash val="solid"/>
-        </a:ln>
-        <a:ln w="25400" cap="flat" cmpd="sng" algn="ctr">
-          <a:solidFill>
-            <a:schemeClr val="phClr"/>
-          </a:solidFill>
-          <a:prstDash val="solid"/>
-        </a:ln>
-        <a:ln w="38100" cap="flat" cmpd="sng" algn="ctr">
-          <a:solidFill>
-            <a:schemeClr val="phClr"/>
-          </a:solidFill>
-          <a:prstDash val="solid"/>
-        </a:ln>
-      </a:lnStyleLst>
-      <a:effectStyleLst>
-        <a:effectStyle>
-          <a:effectLst>
-            <a:outerShdw blurRad="40000" dist="20000" dir="5400000" rotWithShape="0">
-              <a:srgbClr val="000000">
-                <a:alpha val="38000"/>
-              </a:srgbClr>
-            </a:outerShdw>
-          </a:effectLst>
-        </a:effectStyle>
-        <a:effectStyle>
-          <a:effectLst>
-            <a:outerShdw blurRad="40000" dist="23000" dir="5400000" rotWithShape="0">
-              <a:srgbClr val="000000">
-                <a:alpha val="35000"/>
-              </a:srgbClr>
-            </a:outerShdw>
-          </a:effectLst>
-        </a:effectStyle>
-        <a:effectStyle>
-          <a:effectLst>
-            <a:outerShdw blurRad="40000" dist="23000" dir="5400000" rotWithShape="0">
-              <a:srgbClr val="000000">
-                <a:alpha val="35000"/>
-              </a:srgbClr>
-            </a:outerShdw>
-          </a:effectLst>
-        </a:effectStyle>
-      </a:effectStyleLst>
-      <a:bgFillStyleLst>
-        <a:solidFill>
-          <a:schemeClr val="phClr"/>
-        </a:solidFill>
-        <a:gradFill>
-          <a:gsLst>
-            <a:gs pos="0">
-              <a:schemeClr val="phClr">
-                <a:tint val="40000"/>
-                <a:satMod val="350000"/>
-              </a:schemeClr>
-            </a:gs>
-            <a:gs pos="40000">
-              <a:schemeClr val="phClr">
-                <a:tint val="45000"/>
-                <a:shade val="99000"/>
-                <a:satMod val="350000"/>
-              </a:schemeClr>
-            </a:gs>
-            <a:gs pos="100000">
-              <a:schemeClr val="phClr">
-                <a:shade val="20000"/>
-                <a:satMod val="255000"/>
-              </a:schemeClr>
-            </a:gs>
-          </a:gsLst>
-          <a:path path="circle"/>
-        </a:gradFill>
-        <a:gradFill>
-          <a:gsLst>
-            <a:gs pos="0">
-              <a:schemeClr val="phClr">
-                <a:tint val="80000"/>
-                <a:satMod val="300000"/>
-              </a:schemeClr>
-            </a:gs>
-            <a:gs pos="100000">
-              <a:schemeClr val="phClr">
-                <a:shade val="30000"/>
-                <a:satMod val="200000"/>
-              </a:schemeClr>
-            </a:gs>
-          </a:gsLst>
-          <a:path path="circle"/>
-        </a:gradFill>
-      </a:bgFillStyleLst>
-    </a:fmtScheme>
-  </a:themeElements>
-  <a:objectDefaults/>
-</a:theme>
 </file>
</xml_diff>